<commit_message>
overworked doc about project perske
</commit_message>
<xml_diff>
--- a/Dokumentation/Stand Oster/BayerPatternVearbeitung/Grafiken.pptx
+++ b/Dokumentation/Stand Oster/BayerPatternVearbeitung/Grafiken.pptx
@@ -8,6 +8,7 @@
     <p:sldId id="256" r:id="rId2"/>
     <p:sldId id="258" r:id="rId3"/>
     <p:sldId id="257" r:id="rId4"/>
+    <p:sldId id="259" r:id="rId5"/>
   </p:sldIdLst>
   <p:sldSz cx="12192000" cy="6858000"/>
   <p:notesSz cx="6858000" cy="9144000"/>
@@ -106,6 +107,11 @@
       </a:defRPr>
     </a:lvl9pPr>
   </p:defaultTextStyle>
+  <p:extLst>
+    <p:ext uri="{EFAFB233-063F-42B5-8137-9DF3F51BA10A}">
+      <p15:sldGuideLst xmlns:p15="http://schemas.microsoft.com/office/powerpoint/2012/main"/>
+    </p:ext>
+  </p:extLst>
 </p:presentation>
 </file>
 
@@ -256,7 +262,7 @@
           <a:p>
             <a:fld id="{395C48E5-9D41-460D-AEA6-338A2B2E3B37}" type="datetimeFigureOut">
               <a:rPr lang="de-DE" smtClean="0"/>
-              <a:t>29.04.2021</a:t>
+              <a:t>06.05.2021</a:t>
             </a:fld>
             <a:endParaRPr lang="de-DE"/>
           </a:p>
@@ -454,7 +460,7 @@
           <a:p>
             <a:fld id="{395C48E5-9D41-460D-AEA6-338A2B2E3B37}" type="datetimeFigureOut">
               <a:rPr lang="de-DE" smtClean="0"/>
-              <a:t>29.04.2021</a:t>
+              <a:t>06.05.2021</a:t>
             </a:fld>
             <a:endParaRPr lang="de-DE"/>
           </a:p>
@@ -662,7 +668,7 @@
           <a:p>
             <a:fld id="{395C48E5-9D41-460D-AEA6-338A2B2E3B37}" type="datetimeFigureOut">
               <a:rPr lang="de-DE" smtClean="0"/>
-              <a:t>29.04.2021</a:t>
+              <a:t>06.05.2021</a:t>
             </a:fld>
             <a:endParaRPr lang="de-DE"/>
           </a:p>
@@ -860,7 +866,7 @@
           <a:p>
             <a:fld id="{395C48E5-9D41-460D-AEA6-338A2B2E3B37}" type="datetimeFigureOut">
               <a:rPr lang="de-DE" smtClean="0"/>
-              <a:t>29.04.2021</a:t>
+              <a:t>06.05.2021</a:t>
             </a:fld>
             <a:endParaRPr lang="de-DE"/>
           </a:p>
@@ -1135,7 +1141,7 @@
           <a:p>
             <a:fld id="{395C48E5-9D41-460D-AEA6-338A2B2E3B37}" type="datetimeFigureOut">
               <a:rPr lang="de-DE" smtClean="0"/>
-              <a:t>29.04.2021</a:t>
+              <a:t>06.05.2021</a:t>
             </a:fld>
             <a:endParaRPr lang="de-DE"/>
           </a:p>
@@ -1400,7 +1406,7 @@
           <a:p>
             <a:fld id="{395C48E5-9D41-460D-AEA6-338A2B2E3B37}" type="datetimeFigureOut">
               <a:rPr lang="de-DE" smtClean="0"/>
-              <a:t>29.04.2021</a:t>
+              <a:t>06.05.2021</a:t>
             </a:fld>
             <a:endParaRPr lang="de-DE"/>
           </a:p>
@@ -1812,7 +1818,7 @@
           <a:p>
             <a:fld id="{395C48E5-9D41-460D-AEA6-338A2B2E3B37}" type="datetimeFigureOut">
               <a:rPr lang="de-DE" smtClean="0"/>
-              <a:t>29.04.2021</a:t>
+              <a:t>06.05.2021</a:t>
             </a:fld>
             <a:endParaRPr lang="de-DE"/>
           </a:p>
@@ -1953,7 +1959,7 @@
           <a:p>
             <a:fld id="{395C48E5-9D41-460D-AEA6-338A2B2E3B37}" type="datetimeFigureOut">
               <a:rPr lang="de-DE" smtClean="0"/>
-              <a:t>29.04.2021</a:t>
+              <a:t>06.05.2021</a:t>
             </a:fld>
             <a:endParaRPr lang="de-DE"/>
           </a:p>
@@ -2066,7 +2072,7 @@
           <a:p>
             <a:fld id="{395C48E5-9D41-460D-AEA6-338A2B2E3B37}" type="datetimeFigureOut">
               <a:rPr lang="de-DE" smtClean="0"/>
-              <a:t>29.04.2021</a:t>
+              <a:t>06.05.2021</a:t>
             </a:fld>
             <a:endParaRPr lang="de-DE"/>
           </a:p>
@@ -2377,7 +2383,7 @@
           <a:p>
             <a:fld id="{395C48E5-9D41-460D-AEA6-338A2B2E3B37}" type="datetimeFigureOut">
               <a:rPr lang="de-DE" smtClean="0"/>
-              <a:t>29.04.2021</a:t>
+              <a:t>06.05.2021</a:t>
             </a:fld>
             <a:endParaRPr lang="de-DE"/>
           </a:p>
@@ -2665,7 +2671,7 @@
           <a:p>
             <a:fld id="{395C48E5-9D41-460D-AEA6-338A2B2E3B37}" type="datetimeFigureOut">
               <a:rPr lang="de-DE" smtClean="0"/>
-              <a:t>29.04.2021</a:t>
+              <a:t>06.05.2021</a:t>
             </a:fld>
             <a:endParaRPr lang="de-DE"/>
           </a:p>
@@ -2906,7 +2912,7 @@
           <a:p>
             <a:fld id="{395C48E5-9D41-460D-AEA6-338A2B2E3B37}" type="datetimeFigureOut">
               <a:rPr lang="de-DE" smtClean="0"/>
-              <a:t>29.04.2021</a:t>
+              <a:t>06.05.2021</a:t>
             </a:fld>
             <a:endParaRPr lang="de-DE"/>
           </a:p>
@@ -4902,10 +4908,10 @@
       </p:cxnSp>
       <p:sp>
         <p:nvSpPr>
-          <p:cNvPr id="46" name="Textfeld 45">
-            <a:extLst>
-              <a:ext uri="{FF2B5EF4-FFF2-40B4-BE49-F238E27FC236}">
-                <a16:creationId xmlns:a16="http://schemas.microsoft.com/office/drawing/2014/main" id="{B7401AA0-749B-4743-AA85-5359267BB55B}"/>
+          <p:cNvPr id="47" name="Textfeld 46">
+            <a:extLst>
+              <a:ext uri="{FF2B5EF4-FFF2-40B4-BE49-F238E27FC236}">
+                <a16:creationId xmlns:a16="http://schemas.microsoft.com/office/drawing/2014/main" id="{2E1DBBBA-514E-4A5A-BBD2-BE8AC18725E6}"/>
               </a:ext>
             </a:extLst>
           </p:cNvPr>
@@ -4914,8 +4920,8 @@
         </p:nvSpPr>
         <p:spPr>
           <a:xfrm>
-            <a:off x="6997056" y="1517852"/>
-            <a:ext cx="988989" cy="369332"/>
+            <a:off x="6743664" y="3565517"/>
+            <a:ext cx="856325" cy="369332"/>
           </a:xfrm>
           <a:prstGeom prst="rect">
             <a:avLst/>
@@ -4930,17 +4936,17 @@
           <a:p>
             <a:r>
               <a:rPr lang="de-DE" dirty="0"/>
-              <a:t>5x5 Byte</a:t>
-            </a:r>
-          </a:p>
-        </p:txBody>
-      </p:sp>
-      <p:sp>
-        <p:nvSpPr>
-          <p:cNvPr id="47" name="Textfeld 46">
-            <a:extLst>
-              <a:ext uri="{FF2B5EF4-FFF2-40B4-BE49-F238E27FC236}">
-                <a16:creationId xmlns:a16="http://schemas.microsoft.com/office/drawing/2014/main" id="{2E1DBBBA-514E-4A5A-BBD2-BE8AC18725E6}"/>
+              <a:t>Block 2</a:t>
+            </a:r>
+          </a:p>
+        </p:txBody>
+      </p:sp>
+      <p:sp>
+        <p:nvSpPr>
+          <p:cNvPr id="3" name="Textfeld 2">
+            <a:extLst>
+              <a:ext uri="{FF2B5EF4-FFF2-40B4-BE49-F238E27FC236}">
+                <a16:creationId xmlns:a16="http://schemas.microsoft.com/office/drawing/2014/main" id="{DC7DE842-0A4F-4C9D-AA26-927E1418352B}"/>
               </a:ext>
             </a:extLst>
           </p:cNvPr>
@@ -4949,8 +4955,8 @@
         </p:nvSpPr>
         <p:spPr>
           <a:xfrm>
-            <a:off x="6996208" y="3573146"/>
-            <a:ext cx="988989" cy="369332"/>
+            <a:off x="6774808" y="1494312"/>
+            <a:ext cx="856325" cy="369332"/>
           </a:xfrm>
           <a:prstGeom prst="rect">
             <a:avLst/>
@@ -4965,7 +4971,789 @@
           <a:p>
             <a:r>
               <a:rPr lang="de-DE" dirty="0"/>
-              <a:t>5x5 Byte</a:t>
+              <a:t>Block 1</a:t>
+            </a:r>
+          </a:p>
+        </p:txBody>
+      </p:sp>
+      <p:cxnSp>
+        <p:nvCxnSpPr>
+          <p:cNvPr id="5" name="Gerader Verbinder 4">
+            <a:extLst>
+              <a:ext uri="{FF2B5EF4-FFF2-40B4-BE49-F238E27FC236}">
+                <a16:creationId xmlns:a16="http://schemas.microsoft.com/office/drawing/2014/main" id="{23CB132A-F099-48AA-BCA3-98018E870E67}"/>
+              </a:ext>
+            </a:extLst>
+          </p:cNvPr>
+          <p:cNvCxnSpPr/>
+          <p:nvPr/>
+        </p:nvCxnSpPr>
+        <p:spPr>
+          <a:xfrm>
+            <a:off x="8165148" y="1854425"/>
+            <a:ext cx="661860" cy="0"/>
+          </a:xfrm>
+          <a:prstGeom prst="line">
+            <a:avLst/>
+          </a:prstGeom>
+        </p:spPr>
+        <p:style>
+          <a:lnRef idx="1">
+            <a:schemeClr val="accent1"/>
+          </a:lnRef>
+          <a:fillRef idx="0">
+            <a:schemeClr val="accent1"/>
+          </a:fillRef>
+          <a:effectRef idx="0">
+            <a:schemeClr val="accent1"/>
+          </a:effectRef>
+          <a:fontRef idx="minor">
+            <a:schemeClr val="tx1"/>
+          </a:fontRef>
+        </p:style>
+      </p:cxnSp>
+      <p:cxnSp>
+        <p:nvCxnSpPr>
+          <p:cNvPr id="25" name="Gerader Verbinder 24">
+            <a:extLst>
+              <a:ext uri="{FF2B5EF4-FFF2-40B4-BE49-F238E27FC236}">
+                <a16:creationId xmlns:a16="http://schemas.microsoft.com/office/drawing/2014/main" id="{465A1154-53AD-4760-B5CA-B1B0C1CA92CC}"/>
+              </a:ext>
+            </a:extLst>
+          </p:cNvPr>
+          <p:cNvCxnSpPr/>
+          <p:nvPr/>
+        </p:nvCxnSpPr>
+        <p:spPr>
+          <a:xfrm>
+            <a:off x="8165148" y="2128745"/>
+            <a:ext cx="661860" cy="0"/>
+          </a:xfrm>
+          <a:prstGeom prst="line">
+            <a:avLst/>
+          </a:prstGeom>
+        </p:spPr>
+        <p:style>
+          <a:lnRef idx="1">
+            <a:schemeClr val="accent1"/>
+          </a:lnRef>
+          <a:fillRef idx="0">
+            <a:schemeClr val="accent1"/>
+          </a:fillRef>
+          <a:effectRef idx="0">
+            <a:schemeClr val="accent1"/>
+          </a:effectRef>
+          <a:fontRef idx="minor">
+            <a:schemeClr val="tx1"/>
+          </a:fontRef>
+        </p:style>
+      </p:cxnSp>
+      <p:cxnSp>
+        <p:nvCxnSpPr>
+          <p:cNvPr id="26" name="Gerader Verbinder 25">
+            <a:extLst>
+              <a:ext uri="{FF2B5EF4-FFF2-40B4-BE49-F238E27FC236}">
+                <a16:creationId xmlns:a16="http://schemas.microsoft.com/office/drawing/2014/main" id="{7BCBDB9C-2F59-4BE2-B9D6-99EA91E8B02E}"/>
+              </a:ext>
+            </a:extLst>
+          </p:cNvPr>
+          <p:cNvCxnSpPr/>
+          <p:nvPr/>
+        </p:nvCxnSpPr>
+        <p:spPr>
+          <a:xfrm>
+            <a:off x="8165148" y="2403065"/>
+            <a:ext cx="661860" cy="0"/>
+          </a:xfrm>
+          <a:prstGeom prst="line">
+            <a:avLst/>
+          </a:prstGeom>
+        </p:spPr>
+        <p:style>
+          <a:lnRef idx="1">
+            <a:schemeClr val="accent1"/>
+          </a:lnRef>
+          <a:fillRef idx="0">
+            <a:schemeClr val="accent1"/>
+          </a:fillRef>
+          <a:effectRef idx="0">
+            <a:schemeClr val="accent1"/>
+          </a:effectRef>
+          <a:fontRef idx="minor">
+            <a:schemeClr val="tx1"/>
+          </a:fontRef>
+        </p:style>
+      </p:cxnSp>
+      <p:cxnSp>
+        <p:nvCxnSpPr>
+          <p:cNvPr id="27" name="Gerader Verbinder 26">
+            <a:extLst>
+              <a:ext uri="{FF2B5EF4-FFF2-40B4-BE49-F238E27FC236}">
+                <a16:creationId xmlns:a16="http://schemas.microsoft.com/office/drawing/2014/main" id="{04B770AF-DD0C-492F-8504-6B543BB48644}"/>
+              </a:ext>
+            </a:extLst>
+          </p:cNvPr>
+          <p:cNvCxnSpPr/>
+          <p:nvPr/>
+        </p:nvCxnSpPr>
+        <p:spPr>
+          <a:xfrm>
+            <a:off x="8176097" y="2671289"/>
+            <a:ext cx="661860" cy="0"/>
+          </a:xfrm>
+          <a:prstGeom prst="line">
+            <a:avLst/>
+          </a:prstGeom>
+        </p:spPr>
+        <p:style>
+          <a:lnRef idx="1">
+            <a:schemeClr val="accent1"/>
+          </a:lnRef>
+          <a:fillRef idx="0">
+            <a:schemeClr val="accent1"/>
+          </a:fillRef>
+          <a:effectRef idx="0">
+            <a:schemeClr val="accent1"/>
+          </a:effectRef>
+          <a:fontRef idx="minor">
+            <a:schemeClr val="tx1"/>
+          </a:fontRef>
+        </p:style>
+      </p:cxnSp>
+      <p:cxnSp>
+        <p:nvCxnSpPr>
+          <p:cNvPr id="29" name="Gerader Verbinder 28">
+            <a:extLst>
+              <a:ext uri="{FF2B5EF4-FFF2-40B4-BE49-F238E27FC236}">
+                <a16:creationId xmlns:a16="http://schemas.microsoft.com/office/drawing/2014/main" id="{B22DF343-879A-41B0-9732-86BD6533216E}"/>
+              </a:ext>
+            </a:extLst>
+          </p:cNvPr>
+          <p:cNvCxnSpPr/>
+          <p:nvPr/>
+        </p:nvCxnSpPr>
+        <p:spPr>
+          <a:xfrm>
+            <a:off x="8165148" y="2957801"/>
+            <a:ext cx="661860" cy="0"/>
+          </a:xfrm>
+          <a:prstGeom prst="line">
+            <a:avLst/>
+          </a:prstGeom>
+        </p:spPr>
+        <p:style>
+          <a:lnRef idx="1">
+            <a:schemeClr val="accent1"/>
+          </a:lnRef>
+          <a:fillRef idx="0">
+            <a:schemeClr val="accent1"/>
+          </a:fillRef>
+          <a:effectRef idx="0">
+            <a:schemeClr val="accent1"/>
+          </a:effectRef>
+          <a:fontRef idx="minor">
+            <a:schemeClr val="tx1"/>
+          </a:fontRef>
+        </p:style>
+      </p:cxnSp>
+      <p:cxnSp>
+        <p:nvCxnSpPr>
+          <p:cNvPr id="30" name="Gerader Verbinder 29">
+            <a:extLst>
+              <a:ext uri="{FF2B5EF4-FFF2-40B4-BE49-F238E27FC236}">
+                <a16:creationId xmlns:a16="http://schemas.microsoft.com/office/drawing/2014/main" id="{8B13EF71-EEFA-41B1-A06B-AEC03CDC9E95}"/>
+              </a:ext>
+            </a:extLst>
+          </p:cNvPr>
+          <p:cNvCxnSpPr/>
+          <p:nvPr/>
+        </p:nvCxnSpPr>
+        <p:spPr>
+          <a:xfrm>
+            <a:off x="8165148" y="3226034"/>
+            <a:ext cx="661860" cy="0"/>
+          </a:xfrm>
+          <a:prstGeom prst="line">
+            <a:avLst/>
+          </a:prstGeom>
+        </p:spPr>
+        <p:style>
+          <a:lnRef idx="1">
+            <a:schemeClr val="accent1"/>
+          </a:lnRef>
+          <a:fillRef idx="0">
+            <a:schemeClr val="accent1"/>
+          </a:fillRef>
+          <a:effectRef idx="0">
+            <a:schemeClr val="accent1"/>
+          </a:effectRef>
+          <a:fontRef idx="minor">
+            <a:schemeClr val="tx1"/>
+          </a:fontRef>
+        </p:style>
+      </p:cxnSp>
+      <p:sp>
+        <p:nvSpPr>
+          <p:cNvPr id="6" name="Textfeld 5">
+            <a:extLst>
+              <a:ext uri="{FF2B5EF4-FFF2-40B4-BE49-F238E27FC236}">
+                <a16:creationId xmlns:a16="http://schemas.microsoft.com/office/drawing/2014/main" id="{5482C9A6-1B57-49AC-88E8-F8A52E8C33FB}"/>
+              </a:ext>
+            </a:extLst>
+          </p:cNvPr>
+          <p:cNvSpPr txBox="1"/>
+          <p:nvPr/>
+        </p:nvSpPr>
+        <p:spPr>
+          <a:xfrm>
+            <a:off x="8100128" y="1872313"/>
+            <a:ext cx="907684" cy="276999"/>
+          </a:xfrm>
+          <a:prstGeom prst="rect">
+            <a:avLst/>
+          </a:prstGeom>
+          <a:noFill/>
+        </p:spPr>
+        <p:txBody>
+          <a:bodyPr wrap="none" rtlCol="0">
+            <a:spAutoFit/>
+          </a:bodyPr>
+          <a:lstStyle/>
+          <a:p>
+            <a:r>
+              <a:rPr lang="de-DE" sz="1200" dirty="0"/>
+              <a:t>pxl_data_l1</a:t>
+            </a:r>
+          </a:p>
+        </p:txBody>
+      </p:sp>
+      <p:sp>
+        <p:nvSpPr>
+          <p:cNvPr id="32" name="Textfeld 31">
+            <a:extLst>
+              <a:ext uri="{FF2B5EF4-FFF2-40B4-BE49-F238E27FC236}">
+                <a16:creationId xmlns:a16="http://schemas.microsoft.com/office/drawing/2014/main" id="{D298E59B-BD3C-4EC0-8196-F73C549EA10B}"/>
+              </a:ext>
+            </a:extLst>
+          </p:cNvPr>
+          <p:cNvSpPr txBox="1"/>
+          <p:nvPr/>
+        </p:nvSpPr>
+        <p:spPr>
+          <a:xfrm>
+            <a:off x="8100128" y="2128744"/>
+            <a:ext cx="907684" cy="276999"/>
+          </a:xfrm>
+          <a:prstGeom prst="rect">
+            <a:avLst/>
+          </a:prstGeom>
+          <a:noFill/>
+        </p:spPr>
+        <p:txBody>
+          <a:bodyPr wrap="none" rtlCol="0">
+            <a:spAutoFit/>
+          </a:bodyPr>
+          <a:lstStyle/>
+          <a:p>
+            <a:r>
+              <a:rPr lang="de-DE" sz="1200" dirty="0"/>
+              <a:t>pxl_data_l2</a:t>
+            </a:r>
+          </a:p>
+        </p:txBody>
+      </p:sp>
+      <p:sp>
+        <p:nvSpPr>
+          <p:cNvPr id="33" name="Textfeld 32">
+            <a:extLst>
+              <a:ext uri="{FF2B5EF4-FFF2-40B4-BE49-F238E27FC236}">
+                <a16:creationId xmlns:a16="http://schemas.microsoft.com/office/drawing/2014/main" id="{2954BDE7-0AF9-4351-8494-7CE7F567F6FD}"/>
+              </a:ext>
+            </a:extLst>
+          </p:cNvPr>
+          <p:cNvSpPr txBox="1"/>
+          <p:nvPr/>
+        </p:nvSpPr>
+        <p:spPr>
+          <a:xfrm>
+            <a:off x="8100128" y="2388328"/>
+            <a:ext cx="907684" cy="276999"/>
+          </a:xfrm>
+          <a:prstGeom prst="rect">
+            <a:avLst/>
+          </a:prstGeom>
+          <a:noFill/>
+        </p:spPr>
+        <p:txBody>
+          <a:bodyPr wrap="none" rtlCol="0">
+            <a:spAutoFit/>
+          </a:bodyPr>
+          <a:lstStyle/>
+          <a:p>
+            <a:r>
+              <a:rPr lang="de-DE" sz="1200" dirty="0"/>
+              <a:t>pxl_data_l3</a:t>
+            </a:r>
+          </a:p>
+        </p:txBody>
+      </p:sp>
+      <p:sp>
+        <p:nvSpPr>
+          <p:cNvPr id="34" name="Textfeld 33">
+            <a:extLst>
+              <a:ext uri="{FF2B5EF4-FFF2-40B4-BE49-F238E27FC236}">
+                <a16:creationId xmlns:a16="http://schemas.microsoft.com/office/drawing/2014/main" id="{A8583119-92B3-4844-B85E-6C2B7E879107}"/>
+              </a:ext>
+            </a:extLst>
+          </p:cNvPr>
+          <p:cNvSpPr txBox="1"/>
+          <p:nvPr/>
+        </p:nvSpPr>
+        <p:spPr>
+          <a:xfrm>
+            <a:off x="8109778" y="2664077"/>
+            <a:ext cx="907684" cy="276999"/>
+          </a:xfrm>
+          <a:prstGeom prst="rect">
+            <a:avLst/>
+          </a:prstGeom>
+          <a:noFill/>
+        </p:spPr>
+        <p:txBody>
+          <a:bodyPr wrap="none" rtlCol="0">
+            <a:spAutoFit/>
+          </a:bodyPr>
+          <a:lstStyle/>
+          <a:p>
+            <a:r>
+              <a:rPr lang="de-DE" sz="1200" dirty="0"/>
+              <a:t>pxl_data_l4</a:t>
+            </a:r>
+          </a:p>
+        </p:txBody>
+      </p:sp>
+      <p:sp>
+        <p:nvSpPr>
+          <p:cNvPr id="40" name="Textfeld 39">
+            <a:extLst>
+              <a:ext uri="{FF2B5EF4-FFF2-40B4-BE49-F238E27FC236}">
+                <a16:creationId xmlns:a16="http://schemas.microsoft.com/office/drawing/2014/main" id="{AF80D7DF-F2A3-4848-B993-491339999791}"/>
+              </a:ext>
+            </a:extLst>
+          </p:cNvPr>
+          <p:cNvSpPr txBox="1"/>
+          <p:nvPr/>
+        </p:nvSpPr>
+        <p:spPr>
+          <a:xfrm>
+            <a:off x="8116318" y="2963617"/>
+            <a:ext cx="907684" cy="276999"/>
+          </a:xfrm>
+          <a:prstGeom prst="rect">
+            <a:avLst/>
+          </a:prstGeom>
+          <a:noFill/>
+        </p:spPr>
+        <p:txBody>
+          <a:bodyPr wrap="none" rtlCol="0">
+            <a:spAutoFit/>
+          </a:bodyPr>
+          <a:lstStyle/>
+          <a:p>
+            <a:r>
+              <a:rPr lang="de-DE" sz="1200" dirty="0"/>
+              <a:t>pxl_data_l5</a:t>
+            </a:r>
+          </a:p>
+        </p:txBody>
+      </p:sp>
+      <p:cxnSp>
+        <p:nvCxnSpPr>
+          <p:cNvPr id="41" name="Gerader Verbinder 40">
+            <a:extLst>
+              <a:ext uri="{FF2B5EF4-FFF2-40B4-BE49-F238E27FC236}">
+                <a16:creationId xmlns:a16="http://schemas.microsoft.com/office/drawing/2014/main" id="{14A313E3-14ED-4FD2-A5EE-51574EC9DB8A}"/>
+              </a:ext>
+            </a:extLst>
+          </p:cNvPr>
+          <p:cNvCxnSpPr/>
+          <p:nvPr/>
+        </p:nvCxnSpPr>
+        <p:spPr>
+          <a:xfrm>
+            <a:off x="8174814" y="3903220"/>
+            <a:ext cx="661860" cy="0"/>
+          </a:xfrm>
+          <a:prstGeom prst="line">
+            <a:avLst/>
+          </a:prstGeom>
+        </p:spPr>
+        <p:style>
+          <a:lnRef idx="1">
+            <a:schemeClr val="accent1"/>
+          </a:lnRef>
+          <a:fillRef idx="0">
+            <a:schemeClr val="accent1"/>
+          </a:fillRef>
+          <a:effectRef idx="0">
+            <a:schemeClr val="accent1"/>
+          </a:effectRef>
+          <a:fontRef idx="minor">
+            <a:schemeClr val="tx1"/>
+          </a:fontRef>
+        </p:style>
+      </p:cxnSp>
+      <p:cxnSp>
+        <p:nvCxnSpPr>
+          <p:cNvPr id="42" name="Gerader Verbinder 41">
+            <a:extLst>
+              <a:ext uri="{FF2B5EF4-FFF2-40B4-BE49-F238E27FC236}">
+                <a16:creationId xmlns:a16="http://schemas.microsoft.com/office/drawing/2014/main" id="{AF3ACF64-405F-43F2-9CCC-08C953D7C1D3}"/>
+              </a:ext>
+            </a:extLst>
+          </p:cNvPr>
+          <p:cNvCxnSpPr/>
+          <p:nvPr/>
+        </p:nvCxnSpPr>
+        <p:spPr>
+          <a:xfrm>
+            <a:off x="8174814" y="4177540"/>
+            <a:ext cx="661860" cy="0"/>
+          </a:xfrm>
+          <a:prstGeom prst="line">
+            <a:avLst/>
+          </a:prstGeom>
+        </p:spPr>
+        <p:style>
+          <a:lnRef idx="1">
+            <a:schemeClr val="accent1"/>
+          </a:lnRef>
+          <a:fillRef idx="0">
+            <a:schemeClr val="accent1"/>
+          </a:fillRef>
+          <a:effectRef idx="0">
+            <a:schemeClr val="accent1"/>
+          </a:effectRef>
+          <a:fontRef idx="minor">
+            <a:schemeClr val="tx1"/>
+          </a:fontRef>
+        </p:style>
+      </p:cxnSp>
+      <p:cxnSp>
+        <p:nvCxnSpPr>
+          <p:cNvPr id="43" name="Gerader Verbinder 42">
+            <a:extLst>
+              <a:ext uri="{FF2B5EF4-FFF2-40B4-BE49-F238E27FC236}">
+                <a16:creationId xmlns:a16="http://schemas.microsoft.com/office/drawing/2014/main" id="{A4BCCB6A-6433-4204-9EA3-AF0C44FA89B7}"/>
+              </a:ext>
+            </a:extLst>
+          </p:cNvPr>
+          <p:cNvCxnSpPr/>
+          <p:nvPr/>
+        </p:nvCxnSpPr>
+        <p:spPr>
+          <a:xfrm>
+            <a:off x="8174814" y="4451860"/>
+            <a:ext cx="661860" cy="0"/>
+          </a:xfrm>
+          <a:prstGeom prst="line">
+            <a:avLst/>
+          </a:prstGeom>
+        </p:spPr>
+        <p:style>
+          <a:lnRef idx="1">
+            <a:schemeClr val="accent1"/>
+          </a:lnRef>
+          <a:fillRef idx="0">
+            <a:schemeClr val="accent1"/>
+          </a:fillRef>
+          <a:effectRef idx="0">
+            <a:schemeClr val="accent1"/>
+          </a:effectRef>
+          <a:fontRef idx="minor">
+            <a:schemeClr val="tx1"/>
+          </a:fontRef>
+        </p:style>
+      </p:cxnSp>
+      <p:cxnSp>
+        <p:nvCxnSpPr>
+          <p:cNvPr id="44" name="Gerader Verbinder 43">
+            <a:extLst>
+              <a:ext uri="{FF2B5EF4-FFF2-40B4-BE49-F238E27FC236}">
+                <a16:creationId xmlns:a16="http://schemas.microsoft.com/office/drawing/2014/main" id="{85D775C3-DA52-4979-8FCC-0DF6924D8563}"/>
+              </a:ext>
+            </a:extLst>
+          </p:cNvPr>
+          <p:cNvCxnSpPr/>
+          <p:nvPr/>
+        </p:nvCxnSpPr>
+        <p:spPr>
+          <a:xfrm>
+            <a:off x="8185763" y="4720084"/>
+            <a:ext cx="661860" cy="0"/>
+          </a:xfrm>
+          <a:prstGeom prst="line">
+            <a:avLst/>
+          </a:prstGeom>
+        </p:spPr>
+        <p:style>
+          <a:lnRef idx="1">
+            <a:schemeClr val="accent1"/>
+          </a:lnRef>
+          <a:fillRef idx="0">
+            <a:schemeClr val="accent1"/>
+          </a:fillRef>
+          <a:effectRef idx="0">
+            <a:schemeClr val="accent1"/>
+          </a:effectRef>
+          <a:fontRef idx="minor">
+            <a:schemeClr val="tx1"/>
+          </a:fontRef>
+        </p:style>
+      </p:cxnSp>
+      <p:cxnSp>
+        <p:nvCxnSpPr>
+          <p:cNvPr id="45" name="Gerader Verbinder 44">
+            <a:extLst>
+              <a:ext uri="{FF2B5EF4-FFF2-40B4-BE49-F238E27FC236}">
+                <a16:creationId xmlns:a16="http://schemas.microsoft.com/office/drawing/2014/main" id="{C17D0E67-767D-459E-AB33-E211D8B0743F}"/>
+              </a:ext>
+            </a:extLst>
+          </p:cNvPr>
+          <p:cNvCxnSpPr/>
+          <p:nvPr/>
+        </p:nvCxnSpPr>
+        <p:spPr>
+          <a:xfrm>
+            <a:off x="8174814" y="5006596"/>
+            <a:ext cx="661860" cy="0"/>
+          </a:xfrm>
+          <a:prstGeom prst="line">
+            <a:avLst/>
+          </a:prstGeom>
+        </p:spPr>
+        <p:style>
+          <a:lnRef idx="1">
+            <a:schemeClr val="accent1"/>
+          </a:lnRef>
+          <a:fillRef idx="0">
+            <a:schemeClr val="accent1"/>
+          </a:fillRef>
+          <a:effectRef idx="0">
+            <a:schemeClr val="accent1"/>
+          </a:effectRef>
+          <a:fontRef idx="minor">
+            <a:schemeClr val="tx1"/>
+          </a:fontRef>
+        </p:style>
+      </p:cxnSp>
+      <p:cxnSp>
+        <p:nvCxnSpPr>
+          <p:cNvPr id="48" name="Gerader Verbinder 47">
+            <a:extLst>
+              <a:ext uri="{FF2B5EF4-FFF2-40B4-BE49-F238E27FC236}">
+                <a16:creationId xmlns:a16="http://schemas.microsoft.com/office/drawing/2014/main" id="{1BDD3E6C-C435-4CA4-A46E-C3E8243E6E61}"/>
+              </a:ext>
+            </a:extLst>
+          </p:cNvPr>
+          <p:cNvCxnSpPr/>
+          <p:nvPr/>
+        </p:nvCxnSpPr>
+        <p:spPr>
+          <a:xfrm>
+            <a:off x="8174814" y="5274829"/>
+            <a:ext cx="661860" cy="0"/>
+          </a:xfrm>
+          <a:prstGeom prst="line">
+            <a:avLst/>
+          </a:prstGeom>
+        </p:spPr>
+        <p:style>
+          <a:lnRef idx="1">
+            <a:schemeClr val="accent1"/>
+          </a:lnRef>
+          <a:fillRef idx="0">
+            <a:schemeClr val="accent1"/>
+          </a:fillRef>
+          <a:effectRef idx="0">
+            <a:schemeClr val="accent1"/>
+          </a:effectRef>
+          <a:fontRef idx="minor">
+            <a:schemeClr val="tx1"/>
+          </a:fontRef>
+        </p:style>
+      </p:cxnSp>
+      <p:sp>
+        <p:nvSpPr>
+          <p:cNvPr id="49" name="Textfeld 48">
+            <a:extLst>
+              <a:ext uri="{FF2B5EF4-FFF2-40B4-BE49-F238E27FC236}">
+                <a16:creationId xmlns:a16="http://schemas.microsoft.com/office/drawing/2014/main" id="{C5E1780D-5FAB-4A79-9198-515F24A79695}"/>
+              </a:ext>
+            </a:extLst>
+          </p:cNvPr>
+          <p:cNvSpPr txBox="1"/>
+          <p:nvPr/>
+        </p:nvSpPr>
+        <p:spPr>
+          <a:xfrm>
+            <a:off x="8109794" y="3921108"/>
+            <a:ext cx="907684" cy="276999"/>
+          </a:xfrm>
+          <a:prstGeom prst="rect">
+            <a:avLst/>
+          </a:prstGeom>
+          <a:noFill/>
+        </p:spPr>
+        <p:txBody>
+          <a:bodyPr wrap="none" rtlCol="0">
+            <a:spAutoFit/>
+          </a:bodyPr>
+          <a:lstStyle/>
+          <a:p>
+            <a:r>
+              <a:rPr lang="de-DE" sz="1200" dirty="0"/>
+              <a:t>pxl_data_l1</a:t>
+            </a:r>
+          </a:p>
+        </p:txBody>
+      </p:sp>
+      <p:sp>
+        <p:nvSpPr>
+          <p:cNvPr id="50" name="Textfeld 49">
+            <a:extLst>
+              <a:ext uri="{FF2B5EF4-FFF2-40B4-BE49-F238E27FC236}">
+                <a16:creationId xmlns:a16="http://schemas.microsoft.com/office/drawing/2014/main" id="{734D4ADD-9E59-4736-8C20-944469247FF8}"/>
+              </a:ext>
+            </a:extLst>
+          </p:cNvPr>
+          <p:cNvSpPr txBox="1"/>
+          <p:nvPr/>
+        </p:nvSpPr>
+        <p:spPr>
+          <a:xfrm>
+            <a:off x="8109794" y="4177539"/>
+            <a:ext cx="907684" cy="276999"/>
+          </a:xfrm>
+          <a:prstGeom prst="rect">
+            <a:avLst/>
+          </a:prstGeom>
+          <a:noFill/>
+        </p:spPr>
+        <p:txBody>
+          <a:bodyPr wrap="none" rtlCol="0">
+            <a:spAutoFit/>
+          </a:bodyPr>
+          <a:lstStyle/>
+          <a:p>
+            <a:r>
+              <a:rPr lang="de-DE" sz="1200" dirty="0"/>
+              <a:t>pxl_data_l2</a:t>
+            </a:r>
+          </a:p>
+        </p:txBody>
+      </p:sp>
+      <p:sp>
+        <p:nvSpPr>
+          <p:cNvPr id="51" name="Textfeld 50">
+            <a:extLst>
+              <a:ext uri="{FF2B5EF4-FFF2-40B4-BE49-F238E27FC236}">
+                <a16:creationId xmlns:a16="http://schemas.microsoft.com/office/drawing/2014/main" id="{533211A5-D184-4B1F-B7B1-FC2AF19854DD}"/>
+              </a:ext>
+            </a:extLst>
+          </p:cNvPr>
+          <p:cNvSpPr txBox="1"/>
+          <p:nvPr/>
+        </p:nvSpPr>
+        <p:spPr>
+          <a:xfrm>
+            <a:off x="8109794" y="4437123"/>
+            <a:ext cx="907684" cy="276999"/>
+          </a:xfrm>
+          <a:prstGeom prst="rect">
+            <a:avLst/>
+          </a:prstGeom>
+          <a:noFill/>
+        </p:spPr>
+        <p:txBody>
+          <a:bodyPr wrap="none" rtlCol="0">
+            <a:spAutoFit/>
+          </a:bodyPr>
+          <a:lstStyle/>
+          <a:p>
+            <a:r>
+              <a:rPr lang="de-DE" sz="1200" dirty="0"/>
+              <a:t>pxl_data_l3</a:t>
+            </a:r>
+          </a:p>
+        </p:txBody>
+      </p:sp>
+      <p:sp>
+        <p:nvSpPr>
+          <p:cNvPr id="52" name="Textfeld 51">
+            <a:extLst>
+              <a:ext uri="{FF2B5EF4-FFF2-40B4-BE49-F238E27FC236}">
+                <a16:creationId xmlns:a16="http://schemas.microsoft.com/office/drawing/2014/main" id="{D5CEB09B-A5A3-4DE7-9DBA-F3DD23C98114}"/>
+              </a:ext>
+            </a:extLst>
+          </p:cNvPr>
+          <p:cNvSpPr txBox="1"/>
+          <p:nvPr/>
+        </p:nvSpPr>
+        <p:spPr>
+          <a:xfrm>
+            <a:off x="8119444" y="4712872"/>
+            <a:ext cx="907684" cy="276999"/>
+          </a:xfrm>
+          <a:prstGeom prst="rect">
+            <a:avLst/>
+          </a:prstGeom>
+          <a:noFill/>
+        </p:spPr>
+        <p:txBody>
+          <a:bodyPr wrap="none" rtlCol="0">
+            <a:spAutoFit/>
+          </a:bodyPr>
+          <a:lstStyle/>
+          <a:p>
+            <a:r>
+              <a:rPr lang="de-DE" sz="1200" dirty="0"/>
+              <a:t>pxl_data_l4</a:t>
+            </a:r>
+          </a:p>
+        </p:txBody>
+      </p:sp>
+      <p:sp>
+        <p:nvSpPr>
+          <p:cNvPr id="53" name="Textfeld 52">
+            <a:extLst>
+              <a:ext uri="{FF2B5EF4-FFF2-40B4-BE49-F238E27FC236}">
+                <a16:creationId xmlns:a16="http://schemas.microsoft.com/office/drawing/2014/main" id="{85CE26EC-8342-4998-870F-BFEF5860C772}"/>
+              </a:ext>
+            </a:extLst>
+          </p:cNvPr>
+          <p:cNvSpPr txBox="1"/>
+          <p:nvPr/>
+        </p:nvSpPr>
+        <p:spPr>
+          <a:xfrm>
+            <a:off x="8125984" y="5012412"/>
+            <a:ext cx="907684" cy="276999"/>
+          </a:xfrm>
+          <a:prstGeom prst="rect">
+            <a:avLst/>
+          </a:prstGeom>
+          <a:noFill/>
+        </p:spPr>
+        <p:txBody>
+          <a:bodyPr wrap="none" rtlCol="0">
+            <a:spAutoFit/>
+          </a:bodyPr>
+          <a:lstStyle/>
+          <a:p>
+            <a:r>
+              <a:rPr lang="de-DE" sz="1200" dirty="0"/>
+              <a:t>pxl_data_l5</a:t>
             </a:r>
           </a:p>
         </p:txBody>
@@ -4974,6 +5762,1588 @@
     <p:extLst>
       <p:ext uri="{BB962C8B-B14F-4D97-AF65-F5344CB8AC3E}">
         <p14:creationId xmlns:p14="http://schemas.microsoft.com/office/powerpoint/2010/main" val="617598783"/>
+      </p:ext>
+    </p:extLst>
+  </p:cSld>
+  <p:clrMapOvr>
+    <a:masterClrMapping/>
+  </p:clrMapOvr>
+</p:sld>
+</file>
+
+<file path=ppt/slides/slide4.xml><?xml version="1.0" encoding="utf-8"?>
+<p:sld xmlns:a="http://schemas.openxmlformats.org/drawingml/2006/main" xmlns:r="http://schemas.openxmlformats.org/officeDocument/2006/relationships" xmlns:p="http://schemas.openxmlformats.org/presentationml/2006/main">
+  <p:cSld>
+    <p:spTree>
+      <p:nvGrpSpPr>
+        <p:cNvPr id="1" name=""/>
+        <p:cNvGrpSpPr/>
+        <p:nvPr/>
+      </p:nvGrpSpPr>
+      <p:grpSpPr>
+        <a:xfrm>
+          <a:off x="0" y="0"/>
+          <a:ext cx="0" cy="0"/>
+          <a:chOff x="0" y="0"/>
+          <a:chExt cx="0" cy="0"/>
+        </a:xfrm>
+      </p:grpSpPr>
+      <p:sp>
+        <p:nvSpPr>
+          <p:cNvPr id="2" name="Titel 1">
+            <a:extLst>
+              <a:ext uri="{FF2B5EF4-FFF2-40B4-BE49-F238E27FC236}">
+                <a16:creationId xmlns:a16="http://schemas.microsoft.com/office/drawing/2014/main" id="{FAC98E69-CB9E-4D43-A028-8351A2C33287}"/>
+              </a:ext>
+            </a:extLst>
+          </p:cNvPr>
+          <p:cNvSpPr>
+            <a:spLocks noGrp="1"/>
+          </p:cNvSpPr>
+          <p:nvPr>
+            <p:ph type="title"/>
+          </p:nvPr>
+        </p:nvSpPr>
+        <p:spPr>
+          <a:xfrm>
+            <a:off x="770106" y="261343"/>
+            <a:ext cx="10515600" cy="679816"/>
+          </a:xfrm>
+        </p:spPr>
+        <p:txBody>
+          <a:bodyPr>
+            <a:normAutofit fontScale="90000"/>
+          </a:bodyPr>
+          <a:lstStyle/>
+          <a:p>
+            <a:r>
+              <a:rPr lang="de-DE" dirty="0" err="1"/>
+              <a:t>SDRAM_Pixelbuffer_nächste_Zeile</a:t>
+            </a:r>
+            <a:endParaRPr lang="de-DE" dirty="0"/>
+          </a:p>
+        </p:txBody>
+      </p:sp>
+      <p:pic>
+        <p:nvPicPr>
+          <p:cNvPr id="7" name="Grafik 6">
+            <a:extLst>
+              <a:ext uri="{FF2B5EF4-FFF2-40B4-BE49-F238E27FC236}">
+                <a16:creationId xmlns:a16="http://schemas.microsoft.com/office/drawing/2014/main" id="{8DBAAB56-A781-44E3-9BA9-BA48A3397704}"/>
+              </a:ext>
+            </a:extLst>
+          </p:cNvPr>
+          <p:cNvPicPr>
+            <a:picLocks noChangeAspect="1"/>
+          </p:cNvPicPr>
+          <p:nvPr/>
+        </p:nvPicPr>
+        <p:blipFill>
+          <a:blip r:embed="rId2">
+            <a:extLst>
+              <a:ext uri="{28A0092B-C50C-407E-A947-70E740481C1C}">
+                <a14:useLocalDpi xmlns:a14="http://schemas.microsoft.com/office/drawing/2010/main" val="0"/>
+              </a:ext>
+            </a:extLst>
+          </a:blip>
+          <a:stretch>
+            <a:fillRect/>
+          </a:stretch>
+        </p:blipFill>
+        <p:spPr>
+          <a:xfrm>
+            <a:off x="838200" y="2042809"/>
+            <a:ext cx="4435812" cy="2772382"/>
+          </a:xfrm>
+          <a:prstGeom prst="rect">
+            <a:avLst/>
+          </a:prstGeom>
+        </p:spPr>
+      </p:pic>
+      <p:grpSp>
+        <p:nvGrpSpPr>
+          <p:cNvPr id="35" name="Gruppieren 34">
+            <a:extLst>
+              <a:ext uri="{FF2B5EF4-FFF2-40B4-BE49-F238E27FC236}">
+                <a16:creationId xmlns:a16="http://schemas.microsoft.com/office/drawing/2014/main" id="{5F5A0946-3F5F-4203-8FD8-1C440985C7FA}"/>
+              </a:ext>
+            </a:extLst>
+          </p:cNvPr>
+          <p:cNvGrpSpPr/>
+          <p:nvPr/>
+        </p:nvGrpSpPr>
+        <p:grpSpPr>
+          <a:xfrm>
+            <a:off x="6116838" y="1848639"/>
+            <a:ext cx="5542638" cy="3124183"/>
+            <a:chOff x="138314" y="2576226"/>
+            <a:chExt cx="5542638" cy="3124183"/>
+          </a:xfrm>
+        </p:grpSpPr>
+        <p:pic>
+          <p:nvPicPr>
+            <p:cNvPr id="36" name="Grafik 35">
+              <a:extLst>
+                <a:ext uri="{FF2B5EF4-FFF2-40B4-BE49-F238E27FC236}">
+                  <a16:creationId xmlns:a16="http://schemas.microsoft.com/office/drawing/2014/main" id="{4B50ECD0-0351-49FC-8CA3-9EF9659E7FC9}"/>
+                </a:ext>
+              </a:extLst>
+            </p:cNvPr>
+            <p:cNvPicPr>
+              <a:picLocks noChangeAspect="1"/>
+            </p:cNvPicPr>
+            <p:nvPr/>
+          </p:nvPicPr>
+          <p:blipFill>
+            <a:blip r:embed="rId2">
+              <a:extLst>
+                <a:ext uri="{28A0092B-C50C-407E-A947-70E740481C1C}">
+                  <a14:useLocalDpi xmlns:a14="http://schemas.microsoft.com/office/drawing/2010/main" val="0"/>
+                </a:ext>
+              </a:extLst>
+            </a:blip>
+            <a:stretch>
+              <a:fillRect/>
+            </a:stretch>
+          </p:blipFill>
+          <p:spPr>
+            <a:xfrm>
+              <a:off x="541505" y="2576226"/>
+              <a:ext cx="4435812" cy="2772382"/>
+            </a:xfrm>
+            <a:prstGeom prst="rect">
+              <a:avLst/>
+            </a:prstGeom>
+          </p:spPr>
+        </p:pic>
+        <p:sp>
+          <p:nvSpPr>
+            <p:cNvPr id="37" name="Rechteck 36">
+              <a:extLst>
+                <a:ext uri="{FF2B5EF4-FFF2-40B4-BE49-F238E27FC236}">
+                  <a16:creationId xmlns:a16="http://schemas.microsoft.com/office/drawing/2014/main" id="{40618908-B618-495E-8A5F-C843F7466A8F}"/>
+                </a:ext>
+              </a:extLst>
+            </p:cNvPr>
+            <p:cNvSpPr/>
+            <p:nvPr/>
+          </p:nvSpPr>
+          <p:spPr>
+            <a:xfrm>
+              <a:off x="311284" y="3947835"/>
+              <a:ext cx="5369668" cy="1487318"/>
+            </a:xfrm>
+            <a:prstGeom prst="rect">
+              <a:avLst/>
+            </a:prstGeom>
+            <a:solidFill>
+              <a:schemeClr val="bg1"/>
+            </a:solidFill>
+            <a:ln>
+              <a:noFill/>
+            </a:ln>
+          </p:spPr>
+          <p:style>
+            <a:lnRef idx="2">
+              <a:schemeClr val="accent1">
+                <a:shade val="50000"/>
+              </a:schemeClr>
+            </a:lnRef>
+            <a:fillRef idx="1">
+              <a:schemeClr val="accent1"/>
+            </a:fillRef>
+            <a:effectRef idx="0">
+              <a:schemeClr val="accent1"/>
+            </a:effectRef>
+            <a:fontRef idx="minor">
+              <a:schemeClr val="lt1"/>
+            </a:fontRef>
+          </p:style>
+          <p:txBody>
+            <a:bodyPr rtlCol="0" anchor="ctr"/>
+            <a:lstStyle/>
+            <a:p>
+              <a:pPr algn="ctr"/>
+              <a:endParaRPr lang="de-DE"/>
+            </a:p>
+          </p:txBody>
+        </p:sp>
+        <p:sp>
+          <p:nvSpPr>
+            <p:cNvPr id="38" name="Rechteck 37">
+              <a:extLst>
+                <a:ext uri="{FF2B5EF4-FFF2-40B4-BE49-F238E27FC236}">
+                  <a16:creationId xmlns:a16="http://schemas.microsoft.com/office/drawing/2014/main" id="{EFCD3488-CE3C-4EF5-AC10-D7806DDE4F52}"/>
+                </a:ext>
+              </a:extLst>
+            </p:cNvPr>
+            <p:cNvSpPr/>
+            <p:nvPr/>
+          </p:nvSpPr>
+          <p:spPr>
+            <a:xfrm rot="5400000">
+              <a:off x="-1084374" y="3798914"/>
+              <a:ext cx="3124183" cy="678808"/>
+            </a:xfrm>
+            <a:prstGeom prst="rect">
+              <a:avLst/>
+            </a:prstGeom>
+            <a:solidFill>
+              <a:schemeClr val="bg1"/>
+            </a:solidFill>
+            <a:ln>
+              <a:noFill/>
+            </a:ln>
+          </p:spPr>
+          <p:style>
+            <a:lnRef idx="2">
+              <a:schemeClr val="accent1">
+                <a:shade val="50000"/>
+              </a:schemeClr>
+            </a:lnRef>
+            <a:fillRef idx="1">
+              <a:schemeClr val="accent1"/>
+            </a:fillRef>
+            <a:effectRef idx="0">
+              <a:schemeClr val="accent1"/>
+            </a:effectRef>
+            <a:fontRef idx="minor">
+              <a:schemeClr val="lt1"/>
+            </a:fontRef>
+          </p:style>
+          <p:txBody>
+            <a:bodyPr rtlCol="0" anchor="ctr"/>
+            <a:lstStyle/>
+            <a:p>
+              <a:pPr algn="ctr"/>
+              <a:endParaRPr lang="de-DE"/>
+            </a:p>
+          </p:txBody>
+        </p:sp>
+        <p:sp>
+          <p:nvSpPr>
+            <p:cNvPr id="39" name="Rechteck 38">
+              <a:extLst>
+                <a:ext uri="{FF2B5EF4-FFF2-40B4-BE49-F238E27FC236}">
+                  <a16:creationId xmlns:a16="http://schemas.microsoft.com/office/drawing/2014/main" id="{C124C35D-FA82-4DA6-9C7D-46B78AD8A33F}"/>
+                </a:ext>
+              </a:extLst>
+            </p:cNvPr>
+            <p:cNvSpPr/>
+            <p:nvPr/>
+          </p:nvSpPr>
+          <p:spPr>
+            <a:xfrm rot="5400000">
+              <a:off x="2205593" y="2589045"/>
+              <a:ext cx="2933701" cy="2908064"/>
+            </a:xfrm>
+            <a:prstGeom prst="rect">
+              <a:avLst/>
+            </a:prstGeom>
+            <a:solidFill>
+              <a:schemeClr val="bg1"/>
+            </a:solidFill>
+            <a:ln>
+              <a:noFill/>
+            </a:ln>
+          </p:spPr>
+          <p:style>
+            <a:lnRef idx="2">
+              <a:schemeClr val="accent1">
+                <a:shade val="50000"/>
+              </a:schemeClr>
+            </a:lnRef>
+            <a:fillRef idx="1">
+              <a:schemeClr val="accent1"/>
+            </a:fillRef>
+            <a:effectRef idx="0">
+              <a:schemeClr val="accent1"/>
+            </a:effectRef>
+            <a:fontRef idx="minor">
+              <a:schemeClr val="lt1"/>
+            </a:fontRef>
+          </p:style>
+          <p:txBody>
+            <a:bodyPr rtlCol="0" anchor="ctr"/>
+            <a:lstStyle/>
+            <a:p>
+              <a:pPr algn="ctr"/>
+              <a:endParaRPr lang="de-DE"/>
+            </a:p>
+          </p:txBody>
+        </p:sp>
+      </p:grpSp>
+      <p:sp>
+        <p:nvSpPr>
+          <p:cNvPr id="13" name="Textfeld 12">
+            <a:extLst>
+              <a:ext uri="{FF2B5EF4-FFF2-40B4-BE49-F238E27FC236}">
+                <a16:creationId xmlns:a16="http://schemas.microsoft.com/office/drawing/2014/main" id="{131948B4-9D30-4046-B5C0-D9E44C6A4878}"/>
+              </a:ext>
+            </a:extLst>
+          </p:cNvPr>
+          <p:cNvSpPr txBox="1"/>
+          <p:nvPr/>
+        </p:nvSpPr>
+        <p:spPr>
+          <a:xfrm>
+            <a:off x="2611913" y="1662115"/>
+            <a:ext cx="888385" cy="369332"/>
+          </a:xfrm>
+          <a:prstGeom prst="rect">
+            <a:avLst/>
+          </a:prstGeom>
+          <a:noFill/>
+        </p:spPr>
+        <p:txBody>
+          <a:bodyPr wrap="none" rtlCol="0">
+            <a:spAutoFit/>
+          </a:bodyPr>
+          <a:lstStyle/>
+          <a:p>
+            <a:r>
+              <a:rPr lang="de-DE" dirty="0"/>
+              <a:t>SDRAM</a:t>
+            </a:r>
+          </a:p>
+        </p:txBody>
+      </p:sp>
+      <p:sp>
+        <p:nvSpPr>
+          <p:cNvPr id="17" name="Rechteck 16">
+            <a:extLst>
+              <a:ext uri="{FF2B5EF4-FFF2-40B4-BE49-F238E27FC236}">
+                <a16:creationId xmlns:a16="http://schemas.microsoft.com/office/drawing/2014/main" id="{1478E788-791F-461F-AB85-00882B226146}"/>
+              </a:ext>
+            </a:extLst>
+          </p:cNvPr>
+          <p:cNvSpPr/>
+          <p:nvPr/>
+        </p:nvSpPr>
+        <p:spPr>
+          <a:xfrm>
+            <a:off x="3869964" y="2042809"/>
+            <a:ext cx="1379706" cy="1395919"/>
+          </a:xfrm>
+          <a:prstGeom prst="rect">
+            <a:avLst/>
+          </a:prstGeom>
+          <a:noFill/>
+          <a:ln w="76200">
+            <a:solidFill>
+              <a:schemeClr val="tx1"/>
+            </a:solidFill>
+          </a:ln>
+        </p:spPr>
+        <p:style>
+          <a:lnRef idx="2">
+            <a:schemeClr val="accent1">
+              <a:shade val="50000"/>
+            </a:schemeClr>
+          </a:lnRef>
+          <a:fillRef idx="1">
+            <a:schemeClr val="accent1"/>
+          </a:fillRef>
+          <a:effectRef idx="0">
+            <a:schemeClr val="accent1"/>
+          </a:effectRef>
+          <a:fontRef idx="minor">
+            <a:schemeClr val="lt1"/>
+          </a:fontRef>
+        </p:style>
+        <p:txBody>
+          <a:bodyPr rtlCol="0" anchor="ctr"/>
+          <a:lstStyle/>
+          <a:p>
+            <a:pPr algn="ctr"/>
+            <a:endParaRPr lang="de-DE"/>
+          </a:p>
+        </p:txBody>
+      </p:sp>
+      <p:sp>
+        <p:nvSpPr>
+          <p:cNvPr id="24" name="Rechteck 23">
+            <a:extLst>
+              <a:ext uri="{FF2B5EF4-FFF2-40B4-BE49-F238E27FC236}">
+                <a16:creationId xmlns:a16="http://schemas.microsoft.com/office/drawing/2014/main" id="{728BAB5B-BA4C-44F8-A1C3-6F3C3BA21E43}"/>
+              </a:ext>
+            </a:extLst>
+          </p:cNvPr>
+          <p:cNvSpPr/>
+          <p:nvPr/>
+        </p:nvSpPr>
+        <p:spPr>
+          <a:xfrm>
+            <a:off x="879267" y="2338912"/>
+            <a:ext cx="1379706" cy="1395919"/>
+          </a:xfrm>
+          <a:prstGeom prst="rect">
+            <a:avLst/>
+          </a:prstGeom>
+          <a:noFill/>
+          <a:ln w="76200">
+            <a:solidFill>
+              <a:schemeClr val="tx1">
+                <a:lumMod val="65000"/>
+                <a:lumOff val="35000"/>
+                <a:alpha val="80000"/>
+              </a:schemeClr>
+            </a:solidFill>
+          </a:ln>
+        </p:spPr>
+        <p:style>
+          <a:lnRef idx="2">
+            <a:schemeClr val="accent1">
+              <a:shade val="50000"/>
+            </a:schemeClr>
+          </a:lnRef>
+          <a:fillRef idx="1">
+            <a:schemeClr val="accent1"/>
+          </a:fillRef>
+          <a:effectRef idx="0">
+            <a:schemeClr val="accent1"/>
+          </a:effectRef>
+          <a:fontRef idx="minor">
+            <a:schemeClr val="lt1"/>
+          </a:fontRef>
+        </p:style>
+        <p:txBody>
+          <a:bodyPr rtlCol="0" anchor="ctr"/>
+          <a:lstStyle/>
+          <a:p>
+            <a:pPr algn="ctr"/>
+            <a:endParaRPr lang="de-DE" dirty="0"/>
+          </a:p>
+        </p:txBody>
+      </p:sp>
+      <p:cxnSp>
+        <p:nvCxnSpPr>
+          <p:cNvPr id="19" name="Gerade Verbindung mit Pfeil 18">
+            <a:extLst>
+              <a:ext uri="{FF2B5EF4-FFF2-40B4-BE49-F238E27FC236}">
+                <a16:creationId xmlns:a16="http://schemas.microsoft.com/office/drawing/2014/main" id="{371DB6C2-91AD-4FBE-B56C-98CFFB7C5DA1}"/>
+              </a:ext>
+            </a:extLst>
+          </p:cNvPr>
+          <p:cNvCxnSpPr>
+            <a:cxnSpLocks/>
+            <a:stCxn id="17" idx="3"/>
+          </p:cNvCxnSpPr>
+          <p:nvPr/>
+        </p:nvCxnSpPr>
+        <p:spPr>
+          <a:xfrm flipV="1">
+            <a:off x="5249670" y="2463191"/>
+            <a:ext cx="1399584" cy="277578"/>
+          </a:xfrm>
+          <a:prstGeom prst="straightConnector1">
+            <a:avLst/>
+          </a:prstGeom>
+          <a:ln w="57150">
+            <a:tailEnd type="triangle"/>
+          </a:ln>
+        </p:spPr>
+        <p:style>
+          <a:lnRef idx="1">
+            <a:schemeClr val="dk1"/>
+          </a:lnRef>
+          <a:fillRef idx="0">
+            <a:schemeClr val="dk1"/>
+          </a:fillRef>
+          <a:effectRef idx="0">
+            <a:schemeClr val="dk1"/>
+          </a:effectRef>
+          <a:fontRef idx="minor">
+            <a:schemeClr val="tx1"/>
+          </a:fontRef>
+        </p:style>
+      </p:cxnSp>
+      <p:cxnSp>
+        <p:nvCxnSpPr>
+          <p:cNvPr id="28" name="Gerade Verbindung mit Pfeil 27">
+            <a:extLst>
+              <a:ext uri="{FF2B5EF4-FFF2-40B4-BE49-F238E27FC236}">
+                <a16:creationId xmlns:a16="http://schemas.microsoft.com/office/drawing/2014/main" id="{1A976BC5-4A77-4E31-B67E-7D4AC906C1AB}"/>
+              </a:ext>
+            </a:extLst>
+          </p:cNvPr>
+          <p:cNvCxnSpPr>
+            <a:cxnSpLocks/>
+          </p:cNvCxnSpPr>
+          <p:nvPr/>
+        </p:nvCxnSpPr>
+        <p:spPr>
+          <a:xfrm>
+            <a:off x="2290760" y="3295690"/>
+            <a:ext cx="4387723" cy="770046"/>
+          </a:xfrm>
+          <a:prstGeom prst="straightConnector1">
+            <a:avLst/>
+          </a:prstGeom>
+          <a:ln w="57150">
+            <a:solidFill>
+              <a:schemeClr val="tx1">
+                <a:lumMod val="65000"/>
+                <a:lumOff val="35000"/>
+                <a:alpha val="80000"/>
+              </a:schemeClr>
+            </a:solidFill>
+            <a:tailEnd type="triangle"/>
+          </a:ln>
+        </p:spPr>
+        <p:style>
+          <a:lnRef idx="1">
+            <a:schemeClr val="dk1"/>
+          </a:lnRef>
+          <a:fillRef idx="0">
+            <a:schemeClr val="dk1"/>
+          </a:fillRef>
+          <a:effectRef idx="0">
+            <a:schemeClr val="dk1"/>
+          </a:effectRef>
+          <a:fontRef idx="minor">
+            <a:schemeClr val="tx1"/>
+          </a:fontRef>
+        </p:style>
+      </p:cxnSp>
+      <p:sp>
+        <p:nvSpPr>
+          <p:cNvPr id="47" name="Textfeld 46">
+            <a:extLst>
+              <a:ext uri="{FF2B5EF4-FFF2-40B4-BE49-F238E27FC236}">
+                <a16:creationId xmlns:a16="http://schemas.microsoft.com/office/drawing/2014/main" id="{2E1DBBBA-514E-4A5A-BBD2-BE8AC18725E6}"/>
+              </a:ext>
+            </a:extLst>
+          </p:cNvPr>
+          <p:cNvSpPr txBox="1"/>
+          <p:nvPr/>
+        </p:nvSpPr>
+        <p:spPr>
+          <a:xfrm>
+            <a:off x="6743664" y="3565517"/>
+            <a:ext cx="1071127" cy="369332"/>
+          </a:xfrm>
+          <a:prstGeom prst="rect">
+            <a:avLst/>
+          </a:prstGeom>
+          <a:noFill/>
+        </p:spPr>
+        <p:txBody>
+          <a:bodyPr wrap="none" rtlCol="0">
+            <a:spAutoFit/>
+          </a:bodyPr>
+          <a:lstStyle/>
+          <a:p>
+            <a:r>
+              <a:rPr lang="de-DE" dirty="0"/>
+              <a:t>Block x+1</a:t>
+            </a:r>
+          </a:p>
+        </p:txBody>
+      </p:sp>
+      <p:sp>
+        <p:nvSpPr>
+          <p:cNvPr id="3" name="Textfeld 2">
+            <a:extLst>
+              <a:ext uri="{FF2B5EF4-FFF2-40B4-BE49-F238E27FC236}">
+                <a16:creationId xmlns:a16="http://schemas.microsoft.com/office/drawing/2014/main" id="{DC7DE842-0A4F-4C9D-AA26-927E1418352B}"/>
+              </a:ext>
+            </a:extLst>
+          </p:cNvPr>
+          <p:cNvSpPr txBox="1"/>
+          <p:nvPr/>
+        </p:nvSpPr>
+        <p:spPr>
+          <a:xfrm>
+            <a:off x="6705516" y="1496080"/>
+            <a:ext cx="838691" cy="369332"/>
+          </a:xfrm>
+          <a:prstGeom prst="rect">
+            <a:avLst/>
+          </a:prstGeom>
+          <a:noFill/>
+        </p:spPr>
+        <p:txBody>
+          <a:bodyPr wrap="none" rtlCol="0">
+            <a:spAutoFit/>
+          </a:bodyPr>
+          <a:lstStyle/>
+          <a:p>
+            <a:r>
+              <a:rPr lang="de-DE" dirty="0"/>
+              <a:t>Block x</a:t>
+            </a:r>
+          </a:p>
+        </p:txBody>
+      </p:sp>
+      <p:cxnSp>
+        <p:nvCxnSpPr>
+          <p:cNvPr id="5" name="Gerader Verbinder 4">
+            <a:extLst>
+              <a:ext uri="{FF2B5EF4-FFF2-40B4-BE49-F238E27FC236}">
+                <a16:creationId xmlns:a16="http://schemas.microsoft.com/office/drawing/2014/main" id="{23CB132A-F099-48AA-BCA3-98018E870E67}"/>
+              </a:ext>
+            </a:extLst>
+          </p:cNvPr>
+          <p:cNvCxnSpPr/>
+          <p:nvPr/>
+        </p:nvCxnSpPr>
+        <p:spPr>
+          <a:xfrm>
+            <a:off x="8165148" y="1854425"/>
+            <a:ext cx="661860" cy="0"/>
+          </a:xfrm>
+          <a:prstGeom prst="line">
+            <a:avLst/>
+          </a:prstGeom>
+        </p:spPr>
+        <p:style>
+          <a:lnRef idx="1">
+            <a:schemeClr val="accent1"/>
+          </a:lnRef>
+          <a:fillRef idx="0">
+            <a:schemeClr val="accent1"/>
+          </a:fillRef>
+          <a:effectRef idx="0">
+            <a:schemeClr val="accent1"/>
+          </a:effectRef>
+          <a:fontRef idx="minor">
+            <a:schemeClr val="tx1"/>
+          </a:fontRef>
+        </p:style>
+      </p:cxnSp>
+      <p:cxnSp>
+        <p:nvCxnSpPr>
+          <p:cNvPr id="25" name="Gerader Verbinder 24">
+            <a:extLst>
+              <a:ext uri="{FF2B5EF4-FFF2-40B4-BE49-F238E27FC236}">
+                <a16:creationId xmlns:a16="http://schemas.microsoft.com/office/drawing/2014/main" id="{465A1154-53AD-4760-B5CA-B1B0C1CA92CC}"/>
+              </a:ext>
+            </a:extLst>
+          </p:cNvPr>
+          <p:cNvCxnSpPr/>
+          <p:nvPr/>
+        </p:nvCxnSpPr>
+        <p:spPr>
+          <a:xfrm>
+            <a:off x="8165148" y="2128745"/>
+            <a:ext cx="661860" cy="0"/>
+          </a:xfrm>
+          <a:prstGeom prst="line">
+            <a:avLst/>
+          </a:prstGeom>
+        </p:spPr>
+        <p:style>
+          <a:lnRef idx="1">
+            <a:schemeClr val="accent1"/>
+          </a:lnRef>
+          <a:fillRef idx="0">
+            <a:schemeClr val="accent1"/>
+          </a:fillRef>
+          <a:effectRef idx="0">
+            <a:schemeClr val="accent1"/>
+          </a:effectRef>
+          <a:fontRef idx="minor">
+            <a:schemeClr val="tx1"/>
+          </a:fontRef>
+        </p:style>
+      </p:cxnSp>
+      <p:cxnSp>
+        <p:nvCxnSpPr>
+          <p:cNvPr id="26" name="Gerader Verbinder 25">
+            <a:extLst>
+              <a:ext uri="{FF2B5EF4-FFF2-40B4-BE49-F238E27FC236}">
+                <a16:creationId xmlns:a16="http://schemas.microsoft.com/office/drawing/2014/main" id="{7BCBDB9C-2F59-4BE2-B9D6-99EA91E8B02E}"/>
+              </a:ext>
+            </a:extLst>
+          </p:cNvPr>
+          <p:cNvCxnSpPr/>
+          <p:nvPr/>
+        </p:nvCxnSpPr>
+        <p:spPr>
+          <a:xfrm>
+            <a:off x="8165148" y="2403065"/>
+            <a:ext cx="661860" cy="0"/>
+          </a:xfrm>
+          <a:prstGeom prst="line">
+            <a:avLst/>
+          </a:prstGeom>
+        </p:spPr>
+        <p:style>
+          <a:lnRef idx="1">
+            <a:schemeClr val="accent1"/>
+          </a:lnRef>
+          <a:fillRef idx="0">
+            <a:schemeClr val="accent1"/>
+          </a:fillRef>
+          <a:effectRef idx="0">
+            <a:schemeClr val="accent1"/>
+          </a:effectRef>
+          <a:fontRef idx="minor">
+            <a:schemeClr val="tx1"/>
+          </a:fontRef>
+        </p:style>
+      </p:cxnSp>
+      <p:cxnSp>
+        <p:nvCxnSpPr>
+          <p:cNvPr id="27" name="Gerader Verbinder 26">
+            <a:extLst>
+              <a:ext uri="{FF2B5EF4-FFF2-40B4-BE49-F238E27FC236}">
+                <a16:creationId xmlns:a16="http://schemas.microsoft.com/office/drawing/2014/main" id="{04B770AF-DD0C-492F-8504-6B543BB48644}"/>
+              </a:ext>
+            </a:extLst>
+          </p:cNvPr>
+          <p:cNvCxnSpPr/>
+          <p:nvPr/>
+        </p:nvCxnSpPr>
+        <p:spPr>
+          <a:xfrm>
+            <a:off x="8176097" y="2671289"/>
+            <a:ext cx="661860" cy="0"/>
+          </a:xfrm>
+          <a:prstGeom prst="line">
+            <a:avLst/>
+          </a:prstGeom>
+        </p:spPr>
+        <p:style>
+          <a:lnRef idx="1">
+            <a:schemeClr val="accent1"/>
+          </a:lnRef>
+          <a:fillRef idx="0">
+            <a:schemeClr val="accent1"/>
+          </a:fillRef>
+          <a:effectRef idx="0">
+            <a:schemeClr val="accent1"/>
+          </a:effectRef>
+          <a:fontRef idx="minor">
+            <a:schemeClr val="tx1"/>
+          </a:fontRef>
+        </p:style>
+      </p:cxnSp>
+      <p:cxnSp>
+        <p:nvCxnSpPr>
+          <p:cNvPr id="29" name="Gerader Verbinder 28">
+            <a:extLst>
+              <a:ext uri="{FF2B5EF4-FFF2-40B4-BE49-F238E27FC236}">
+                <a16:creationId xmlns:a16="http://schemas.microsoft.com/office/drawing/2014/main" id="{B22DF343-879A-41B0-9732-86BD6533216E}"/>
+              </a:ext>
+            </a:extLst>
+          </p:cNvPr>
+          <p:cNvCxnSpPr/>
+          <p:nvPr/>
+        </p:nvCxnSpPr>
+        <p:spPr>
+          <a:xfrm>
+            <a:off x="8165148" y="2957801"/>
+            <a:ext cx="661860" cy="0"/>
+          </a:xfrm>
+          <a:prstGeom prst="line">
+            <a:avLst/>
+          </a:prstGeom>
+        </p:spPr>
+        <p:style>
+          <a:lnRef idx="1">
+            <a:schemeClr val="accent1"/>
+          </a:lnRef>
+          <a:fillRef idx="0">
+            <a:schemeClr val="accent1"/>
+          </a:fillRef>
+          <a:effectRef idx="0">
+            <a:schemeClr val="accent1"/>
+          </a:effectRef>
+          <a:fontRef idx="minor">
+            <a:schemeClr val="tx1"/>
+          </a:fontRef>
+        </p:style>
+      </p:cxnSp>
+      <p:cxnSp>
+        <p:nvCxnSpPr>
+          <p:cNvPr id="30" name="Gerader Verbinder 29">
+            <a:extLst>
+              <a:ext uri="{FF2B5EF4-FFF2-40B4-BE49-F238E27FC236}">
+                <a16:creationId xmlns:a16="http://schemas.microsoft.com/office/drawing/2014/main" id="{8B13EF71-EEFA-41B1-A06B-AEC03CDC9E95}"/>
+              </a:ext>
+            </a:extLst>
+          </p:cNvPr>
+          <p:cNvCxnSpPr/>
+          <p:nvPr/>
+        </p:nvCxnSpPr>
+        <p:spPr>
+          <a:xfrm>
+            <a:off x="8165148" y="3226034"/>
+            <a:ext cx="661860" cy="0"/>
+          </a:xfrm>
+          <a:prstGeom prst="line">
+            <a:avLst/>
+          </a:prstGeom>
+        </p:spPr>
+        <p:style>
+          <a:lnRef idx="1">
+            <a:schemeClr val="accent1"/>
+          </a:lnRef>
+          <a:fillRef idx="0">
+            <a:schemeClr val="accent1"/>
+          </a:fillRef>
+          <a:effectRef idx="0">
+            <a:schemeClr val="accent1"/>
+          </a:effectRef>
+          <a:fontRef idx="minor">
+            <a:schemeClr val="tx1"/>
+          </a:fontRef>
+        </p:style>
+      </p:cxnSp>
+      <p:sp>
+        <p:nvSpPr>
+          <p:cNvPr id="6" name="Textfeld 5">
+            <a:extLst>
+              <a:ext uri="{FF2B5EF4-FFF2-40B4-BE49-F238E27FC236}">
+                <a16:creationId xmlns:a16="http://schemas.microsoft.com/office/drawing/2014/main" id="{5482C9A6-1B57-49AC-88E8-F8A52E8C33FB}"/>
+              </a:ext>
+            </a:extLst>
+          </p:cNvPr>
+          <p:cNvSpPr txBox="1"/>
+          <p:nvPr/>
+        </p:nvSpPr>
+        <p:spPr>
+          <a:xfrm>
+            <a:off x="8100128" y="1872313"/>
+            <a:ext cx="907684" cy="276999"/>
+          </a:xfrm>
+          <a:prstGeom prst="rect">
+            <a:avLst/>
+          </a:prstGeom>
+          <a:noFill/>
+        </p:spPr>
+        <p:txBody>
+          <a:bodyPr wrap="none" rtlCol="0">
+            <a:spAutoFit/>
+          </a:bodyPr>
+          <a:lstStyle/>
+          <a:p>
+            <a:r>
+              <a:rPr lang="de-DE" sz="1200" dirty="0"/>
+              <a:t>pxl_data_l1</a:t>
+            </a:r>
+          </a:p>
+        </p:txBody>
+      </p:sp>
+      <p:sp>
+        <p:nvSpPr>
+          <p:cNvPr id="32" name="Textfeld 31">
+            <a:extLst>
+              <a:ext uri="{FF2B5EF4-FFF2-40B4-BE49-F238E27FC236}">
+                <a16:creationId xmlns:a16="http://schemas.microsoft.com/office/drawing/2014/main" id="{D298E59B-BD3C-4EC0-8196-F73C549EA10B}"/>
+              </a:ext>
+            </a:extLst>
+          </p:cNvPr>
+          <p:cNvSpPr txBox="1"/>
+          <p:nvPr/>
+        </p:nvSpPr>
+        <p:spPr>
+          <a:xfrm>
+            <a:off x="8100128" y="2128744"/>
+            <a:ext cx="907684" cy="276999"/>
+          </a:xfrm>
+          <a:prstGeom prst="rect">
+            <a:avLst/>
+          </a:prstGeom>
+          <a:noFill/>
+        </p:spPr>
+        <p:txBody>
+          <a:bodyPr wrap="none" rtlCol="0">
+            <a:spAutoFit/>
+          </a:bodyPr>
+          <a:lstStyle/>
+          <a:p>
+            <a:r>
+              <a:rPr lang="de-DE" sz="1200" dirty="0"/>
+              <a:t>pxl_data_l2</a:t>
+            </a:r>
+          </a:p>
+        </p:txBody>
+      </p:sp>
+      <p:sp>
+        <p:nvSpPr>
+          <p:cNvPr id="33" name="Textfeld 32">
+            <a:extLst>
+              <a:ext uri="{FF2B5EF4-FFF2-40B4-BE49-F238E27FC236}">
+                <a16:creationId xmlns:a16="http://schemas.microsoft.com/office/drawing/2014/main" id="{2954BDE7-0AF9-4351-8494-7CE7F567F6FD}"/>
+              </a:ext>
+            </a:extLst>
+          </p:cNvPr>
+          <p:cNvSpPr txBox="1"/>
+          <p:nvPr/>
+        </p:nvSpPr>
+        <p:spPr>
+          <a:xfrm>
+            <a:off x="8100128" y="2388328"/>
+            <a:ext cx="907684" cy="276999"/>
+          </a:xfrm>
+          <a:prstGeom prst="rect">
+            <a:avLst/>
+          </a:prstGeom>
+          <a:noFill/>
+        </p:spPr>
+        <p:txBody>
+          <a:bodyPr wrap="none" rtlCol="0">
+            <a:spAutoFit/>
+          </a:bodyPr>
+          <a:lstStyle/>
+          <a:p>
+            <a:r>
+              <a:rPr lang="de-DE" sz="1200" dirty="0"/>
+              <a:t>pxl_data_l3</a:t>
+            </a:r>
+          </a:p>
+        </p:txBody>
+      </p:sp>
+      <p:sp>
+        <p:nvSpPr>
+          <p:cNvPr id="34" name="Textfeld 33">
+            <a:extLst>
+              <a:ext uri="{FF2B5EF4-FFF2-40B4-BE49-F238E27FC236}">
+                <a16:creationId xmlns:a16="http://schemas.microsoft.com/office/drawing/2014/main" id="{A8583119-92B3-4844-B85E-6C2B7E879107}"/>
+              </a:ext>
+            </a:extLst>
+          </p:cNvPr>
+          <p:cNvSpPr txBox="1"/>
+          <p:nvPr/>
+        </p:nvSpPr>
+        <p:spPr>
+          <a:xfrm>
+            <a:off x="8109778" y="2664077"/>
+            <a:ext cx="907684" cy="276999"/>
+          </a:xfrm>
+          <a:prstGeom prst="rect">
+            <a:avLst/>
+          </a:prstGeom>
+          <a:noFill/>
+        </p:spPr>
+        <p:txBody>
+          <a:bodyPr wrap="none" rtlCol="0">
+            <a:spAutoFit/>
+          </a:bodyPr>
+          <a:lstStyle/>
+          <a:p>
+            <a:r>
+              <a:rPr lang="de-DE" sz="1200" dirty="0"/>
+              <a:t>pxl_data_l4</a:t>
+            </a:r>
+          </a:p>
+        </p:txBody>
+      </p:sp>
+      <p:sp>
+        <p:nvSpPr>
+          <p:cNvPr id="40" name="Textfeld 39">
+            <a:extLst>
+              <a:ext uri="{FF2B5EF4-FFF2-40B4-BE49-F238E27FC236}">
+                <a16:creationId xmlns:a16="http://schemas.microsoft.com/office/drawing/2014/main" id="{AF80D7DF-F2A3-4848-B993-491339999791}"/>
+              </a:ext>
+            </a:extLst>
+          </p:cNvPr>
+          <p:cNvSpPr txBox="1"/>
+          <p:nvPr/>
+        </p:nvSpPr>
+        <p:spPr>
+          <a:xfrm>
+            <a:off x="8116318" y="2963617"/>
+            <a:ext cx="907684" cy="276999"/>
+          </a:xfrm>
+          <a:prstGeom prst="rect">
+            <a:avLst/>
+          </a:prstGeom>
+          <a:noFill/>
+        </p:spPr>
+        <p:txBody>
+          <a:bodyPr wrap="none" rtlCol="0">
+            <a:spAutoFit/>
+          </a:bodyPr>
+          <a:lstStyle/>
+          <a:p>
+            <a:r>
+              <a:rPr lang="de-DE" sz="1200" dirty="0"/>
+              <a:t>pxl_data_l5</a:t>
+            </a:r>
+          </a:p>
+        </p:txBody>
+      </p:sp>
+      <p:grpSp>
+        <p:nvGrpSpPr>
+          <p:cNvPr id="54" name="Gruppieren 53">
+            <a:extLst>
+              <a:ext uri="{FF2B5EF4-FFF2-40B4-BE49-F238E27FC236}">
+                <a16:creationId xmlns:a16="http://schemas.microsoft.com/office/drawing/2014/main" id="{2D7524E6-4AA1-4F42-8C72-E3613D82EEC0}"/>
+              </a:ext>
+            </a:extLst>
+          </p:cNvPr>
+          <p:cNvGrpSpPr/>
+          <p:nvPr/>
+        </p:nvGrpSpPr>
+        <p:grpSpPr>
+          <a:xfrm>
+            <a:off x="6822225" y="3886363"/>
+            <a:ext cx="4435812" cy="2806096"/>
+            <a:chOff x="1660188" y="1882635"/>
+            <a:chExt cx="4435812" cy="2806096"/>
+          </a:xfrm>
+        </p:grpSpPr>
+        <p:grpSp>
+          <p:nvGrpSpPr>
+            <p:cNvPr id="55" name="Gruppieren 54">
+              <a:extLst>
+                <a:ext uri="{FF2B5EF4-FFF2-40B4-BE49-F238E27FC236}">
+                  <a16:creationId xmlns:a16="http://schemas.microsoft.com/office/drawing/2014/main" id="{02310684-833D-4209-B7FD-114400806524}"/>
+                </a:ext>
+              </a:extLst>
+            </p:cNvPr>
+            <p:cNvGrpSpPr/>
+            <p:nvPr/>
+          </p:nvGrpSpPr>
+          <p:grpSpPr>
+            <a:xfrm>
+              <a:off x="1660188" y="1899492"/>
+              <a:ext cx="4435812" cy="2789239"/>
+              <a:chOff x="1660188" y="1899492"/>
+              <a:chExt cx="4435812" cy="2789239"/>
+            </a:xfrm>
+          </p:grpSpPr>
+          <p:pic>
+            <p:nvPicPr>
+              <p:cNvPr id="57" name="Grafik 56">
+                <a:extLst>
+                  <a:ext uri="{FF2B5EF4-FFF2-40B4-BE49-F238E27FC236}">
+                    <a16:creationId xmlns:a16="http://schemas.microsoft.com/office/drawing/2014/main" id="{DA9B366F-9B17-47C8-A24C-52FE36BF588D}"/>
+                  </a:ext>
+                </a:extLst>
+              </p:cNvPr>
+              <p:cNvPicPr>
+                <a:picLocks noChangeAspect="1"/>
+              </p:cNvPicPr>
+              <p:nvPr/>
+            </p:nvPicPr>
+            <p:blipFill>
+              <a:blip r:embed="rId2">
+                <a:extLst>
+                  <a:ext uri="{28A0092B-C50C-407E-A947-70E740481C1C}">
+                    <a14:useLocalDpi xmlns:a14="http://schemas.microsoft.com/office/drawing/2010/main" val="0"/>
+                  </a:ext>
+                </a:extLst>
+              </a:blip>
+              <a:stretch>
+                <a:fillRect/>
+              </a:stretch>
+            </p:blipFill>
+            <p:spPr>
+              <a:xfrm>
+                <a:off x="1660188" y="1899492"/>
+                <a:ext cx="4435812" cy="2772382"/>
+              </a:xfrm>
+              <a:prstGeom prst="rect">
+                <a:avLst/>
+              </a:prstGeom>
+            </p:spPr>
+          </p:pic>
+          <p:sp>
+            <p:nvSpPr>
+              <p:cNvPr id="58" name="Rechteck 57">
+                <a:extLst>
+                  <a:ext uri="{FF2B5EF4-FFF2-40B4-BE49-F238E27FC236}">
+                    <a16:creationId xmlns:a16="http://schemas.microsoft.com/office/drawing/2014/main" id="{0B85AC62-86F6-4BED-81C9-9671766451DE}"/>
+                  </a:ext>
+                </a:extLst>
+              </p:cNvPr>
+              <p:cNvSpPr/>
+              <p:nvPr/>
+            </p:nvSpPr>
+            <p:spPr>
+              <a:xfrm>
+                <a:off x="1660188" y="3271101"/>
+                <a:ext cx="4435812" cy="1417630"/>
+              </a:xfrm>
+              <a:prstGeom prst="rect">
+                <a:avLst/>
+              </a:prstGeom>
+              <a:solidFill>
+                <a:schemeClr val="bg1"/>
+              </a:solidFill>
+              <a:ln>
+                <a:noFill/>
+              </a:ln>
+            </p:spPr>
+            <p:style>
+              <a:lnRef idx="2">
+                <a:schemeClr val="accent1">
+                  <a:shade val="50000"/>
+                </a:schemeClr>
+              </a:lnRef>
+              <a:fillRef idx="1">
+                <a:schemeClr val="accent1"/>
+              </a:fillRef>
+              <a:effectRef idx="0">
+                <a:schemeClr val="accent1"/>
+              </a:effectRef>
+              <a:fontRef idx="minor">
+                <a:schemeClr val="lt1"/>
+              </a:fontRef>
+            </p:style>
+            <p:txBody>
+              <a:bodyPr rtlCol="0" anchor="ctr"/>
+              <a:lstStyle/>
+              <a:p>
+                <a:pPr algn="ctr"/>
+                <a:endParaRPr lang="de-DE"/>
+              </a:p>
+            </p:txBody>
+          </p:sp>
+        </p:grpSp>
+        <p:sp>
+          <p:nvSpPr>
+            <p:cNvPr id="56" name="Rechteck 55">
+              <a:extLst>
+                <a:ext uri="{FF2B5EF4-FFF2-40B4-BE49-F238E27FC236}">
+                  <a16:creationId xmlns:a16="http://schemas.microsoft.com/office/drawing/2014/main" id="{4B7C7CFC-634F-4DC9-B128-D1D427358E19}"/>
+                </a:ext>
+              </a:extLst>
+            </p:cNvPr>
+            <p:cNvSpPr/>
+            <p:nvPr/>
+          </p:nvSpPr>
+          <p:spPr>
+            <a:xfrm>
+              <a:off x="3035430" y="1882635"/>
+              <a:ext cx="3060569" cy="1388466"/>
+            </a:xfrm>
+            <a:prstGeom prst="rect">
+              <a:avLst/>
+            </a:prstGeom>
+            <a:solidFill>
+              <a:schemeClr val="bg1"/>
+            </a:solidFill>
+            <a:ln>
+              <a:noFill/>
+            </a:ln>
+          </p:spPr>
+          <p:style>
+            <a:lnRef idx="2">
+              <a:schemeClr val="accent1">
+                <a:shade val="50000"/>
+              </a:schemeClr>
+            </a:lnRef>
+            <a:fillRef idx="1">
+              <a:schemeClr val="accent1"/>
+            </a:fillRef>
+            <a:effectRef idx="0">
+              <a:schemeClr val="accent1"/>
+            </a:effectRef>
+            <a:fontRef idx="minor">
+              <a:schemeClr val="lt1"/>
+            </a:fontRef>
+          </p:style>
+          <p:txBody>
+            <a:bodyPr rtlCol="0" anchor="ctr"/>
+            <a:lstStyle/>
+            <a:p>
+              <a:pPr algn="ctr"/>
+              <a:endParaRPr lang="de-DE" dirty="0"/>
+            </a:p>
+          </p:txBody>
+        </p:sp>
+      </p:grpSp>
+      <p:cxnSp>
+        <p:nvCxnSpPr>
+          <p:cNvPr id="41" name="Gerader Verbinder 40">
+            <a:extLst>
+              <a:ext uri="{FF2B5EF4-FFF2-40B4-BE49-F238E27FC236}">
+                <a16:creationId xmlns:a16="http://schemas.microsoft.com/office/drawing/2014/main" id="{14A313E3-14ED-4FD2-A5EE-51574EC9DB8A}"/>
+              </a:ext>
+            </a:extLst>
+          </p:cNvPr>
+          <p:cNvCxnSpPr/>
+          <p:nvPr/>
+        </p:nvCxnSpPr>
+        <p:spPr>
+          <a:xfrm>
+            <a:off x="8174814" y="3903220"/>
+            <a:ext cx="661860" cy="0"/>
+          </a:xfrm>
+          <a:prstGeom prst="line">
+            <a:avLst/>
+          </a:prstGeom>
+        </p:spPr>
+        <p:style>
+          <a:lnRef idx="1">
+            <a:schemeClr val="accent1"/>
+          </a:lnRef>
+          <a:fillRef idx="0">
+            <a:schemeClr val="accent1"/>
+          </a:fillRef>
+          <a:effectRef idx="0">
+            <a:schemeClr val="accent1"/>
+          </a:effectRef>
+          <a:fontRef idx="minor">
+            <a:schemeClr val="tx1"/>
+          </a:fontRef>
+        </p:style>
+      </p:cxnSp>
+      <p:cxnSp>
+        <p:nvCxnSpPr>
+          <p:cNvPr id="42" name="Gerader Verbinder 41">
+            <a:extLst>
+              <a:ext uri="{FF2B5EF4-FFF2-40B4-BE49-F238E27FC236}">
+                <a16:creationId xmlns:a16="http://schemas.microsoft.com/office/drawing/2014/main" id="{AF3ACF64-405F-43F2-9CCC-08C953D7C1D3}"/>
+              </a:ext>
+            </a:extLst>
+          </p:cNvPr>
+          <p:cNvCxnSpPr/>
+          <p:nvPr/>
+        </p:nvCxnSpPr>
+        <p:spPr>
+          <a:xfrm>
+            <a:off x="8174814" y="4177540"/>
+            <a:ext cx="661860" cy="0"/>
+          </a:xfrm>
+          <a:prstGeom prst="line">
+            <a:avLst/>
+          </a:prstGeom>
+        </p:spPr>
+        <p:style>
+          <a:lnRef idx="1">
+            <a:schemeClr val="accent1"/>
+          </a:lnRef>
+          <a:fillRef idx="0">
+            <a:schemeClr val="accent1"/>
+          </a:fillRef>
+          <a:effectRef idx="0">
+            <a:schemeClr val="accent1"/>
+          </a:effectRef>
+          <a:fontRef idx="minor">
+            <a:schemeClr val="tx1"/>
+          </a:fontRef>
+        </p:style>
+      </p:cxnSp>
+      <p:cxnSp>
+        <p:nvCxnSpPr>
+          <p:cNvPr id="43" name="Gerader Verbinder 42">
+            <a:extLst>
+              <a:ext uri="{FF2B5EF4-FFF2-40B4-BE49-F238E27FC236}">
+                <a16:creationId xmlns:a16="http://schemas.microsoft.com/office/drawing/2014/main" id="{A4BCCB6A-6433-4204-9EA3-AF0C44FA89B7}"/>
+              </a:ext>
+            </a:extLst>
+          </p:cNvPr>
+          <p:cNvCxnSpPr/>
+          <p:nvPr/>
+        </p:nvCxnSpPr>
+        <p:spPr>
+          <a:xfrm>
+            <a:off x="8174814" y="4451860"/>
+            <a:ext cx="661860" cy="0"/>
+          </a:xfrm>
+          <a:prstGeom prst="line">
+            <a:avLst/>
+          </a:prstGeom>
+        </p:spPr>
+        <p:style>
+          <a:lnRef idx="1">
+            <a:schemeClr val="accent1"/>
+          </a:lnRef>
+          <a:fillRef idx="0">
+            <a:schemeClr val="accent1"/>
+          </a:fillRef>
+          <a:effectRef idx="0">
+            <a:schemeClr val="accent1"/>
+          </a:effectRef>
+          <a:fontRef idx="minor">
+            <a:schemeClr val="tx1"/>
+          </a:fontRef>
+        </p:style>
+      </p:cxnSp>
+      <p:cxnSp>
+        <p:nvCxnSpPr>
+          <p:cNvPr id="44" name="Gerader Verbinder 43">
+            <a:extLst>
+              <a:ext uri="{FF2B5EF4-FFF2-40B4-BE49-F238E27FC236}">
+                <a16:creationId xmlns:a16="http://schemas.microsoft.com/office/drawing/2014/main" id="{85D775C3-DA52-4979-8FCC-0DF6924D8563}"/>
+              </a:ext>
+            </a:extLst>
+          </p:cNvPr>
+          <p:cNvCxnSpPr/>
+          <p:nvPr/>
+        </p:nvCxnSpPr>
+        <p:spPr>
+          <a:xfrm>
+            <a:off x="8185763" y="4720084"/>
+            <a:ext cx="661860" cy="0"/>
+          </a:xfrm>
+          <a:prstGeom prst="line">
+            <a:avLst/>
+          </a:prstGeom>
+        </p:spPr>
+        <p:style>
+          <a:lnRef idx="1">
+            <a:schemeClr val="accent1"/>
+          </a:lnRef>
+          <a:fillRef idx="0">
+            <a:schemeClr val="accent1"/>
+          </a:fillRef>
+          <a:effectRef idx="0">
+            <a:schemeClr val="accent1"/>
+          </a:effectRef>
+          <a:fontRef idx="minor">
+            <a:schemeClr val="tx1"/>
+          </a:fontRef>
+        </p:style>
+      </p:cxnSp>
+      <p:cxnSp>
+        <p:nvCxnSpPr>
+          <p:cNvPr id="45" name="Gerader Verbinder 44">
+            <a:extLst>
+              <a:ext uri="{FF2B5EF4-FFF2-40B4-BE49-F238E27FC236}">
+                <a16:creationId xmlns:a16="http://schemas.microsoft.com/office/drawing/2014/main" id="{C17D0E67-767D-459E-AB33-E211D8B0743F}"/>
+              </a:ext>
+            </a:extLst>
+          </p:cNvPr>
+          <p:cNvCxnSpPr/>
+          <p:nvPr/>
+        </p:nvCxnSpPr>
+        <p:spPr>
+          <a:xfrm>
+            <a:off x="8174814" y="5006596"/>
+            <a:ext cx="661860" cy="0"/>
+          </a:xfrm>
+          <a:prstGeom prst="line">
+            <a:avLst/>
+          </a:prstGeom>
+        </p:spPr>
+        <p:style>
+          <a:lnRef idx="1">
+            <a:schemeClr val="accent1"/>
+          </a:lnRef>
+          <a:fillRef idx="0">
+            <a:schemeClr val="accent1"/>
+          </a:fillRef>
+          <a:effectRef idx="0">
+            <a:schemeClr val="accent1"/>
+          </a:effectRef>
+          <a:fontRef idx="minor">
+            <a:schemeClr val="tx1"/>
+          </a:fontRef>
+        </p:style>
+      </p:cxnSp>
+      <p:cxnSp>
+        <p:nvCxnSpPr>
+          <p:cNvPr id="48" name="Gerader Verbinder 47">
+            <a:extLst>
+              <a:ext uri="{FF2B5EF4-FFF2-40B4-BE49-F238E27FC236}">
+                <a16:creationId xmlns:a16="http://schemas.microsoft.com/office/drawing/2014/main" id="{1BDD3E6C-C435-4CA4-A46E-C3E8243E6E61}"/>
+              </a:ext>
+            </a:extLst>
+          </p:cNvPr>
+          <p:cNvCxnSpPr/>
+          <p:nvPr/>
+        </p:nvCxnSpPr>
+        <p:spPr>
+          <a:xfrm>
+            <a:off x="8174814" y="5274829"/>
+            <a:ext cx="661860" cy="0"/>
+          </a:xfrm>
+          <a:prstGeom prst="line">
+            <a:avLst/>
+          </a:prstGeom>
+        </p:spPr>
+        <p:style>
+          <a:lnRef idx="1">
+            <a:schemeClr val="accent1"/>
+          </a:lnRef>
+          <a:fillRef idx="0">
+            <a:schemeClr val="accent1"/>
+          </a:fillRef>
+          <a:effectRef idx="0">
+            <a:schemeClr val="accent1"/>
+          </a:effectRef>
+          <a:fontRef idx="minor">
+            <a:schemeClr val="tx1"/>
+          </a:fontRef>
+        </p:style>
+      </p:cxnSp>
+      <p:sp>
+        <p:nvSpPr>
+          <p:cNvPr id="49" name="Textfeld 48">
+            <a:extLst>
+              <a:ext uri="{FF2B5EF4-FFF2-40B4-BE49-F238E27FC236}">
+                <a16:creationId xmlns:a16="http://schemas.microsoft.com/office/drawing/2014/main" id="{C5E1780D-5FAB-4A79-9198-515F24A79695}"/>
+              </a:ext>
+            </a:extLst>
+          </p:cNvPr>
+          <p:cNvSpPr txBox="1"/>
+          <p:nvPr/>
+        </p:nvSpPr>
+        <p:spPr>
+          <a:xfrm>
+            <a:off x="8109794" y="3921108"/>
+            <a:ext cx="907684" cy="276999"/>
+          </a:xfrm>
+          <a:prstGeom prst="rect">
+            <a:avLst/>
+          </a:prstGeom>
+          <a:noFill/>
+        </p:spPr>
+        <p:txBody>
+          <a:bodyPr wrap="none" rtlCol="0">
+            <a:spAutoFit/>
+          </a:bodyPr>
+          <a:lstStyle/>
+          <a:p>
+            <a:r>
+              <a:rPr lang="de-DE" sz="1200" dirty="0"/>
+              <a:t>pxl_data_l1</a:t>
+            </a:r>
+          </a:p>
+        </p:txBody>
+      </p:sp>
+      <p:sp>
+        <p:nvSpPr>
+          <p:cNvPr id="50" name="Textfeld 49">
+            <a:extLst>
+              <a:ext uri="{FF2B5EF4-FFF2-40B4-BE49-F238E27FC236}">
+                <a16:creationId xmlns:a16="http://schemas.microsoft.com/office/drawing/2014/main" id="{734D4ADD-9E59-4736-8C20-944469247FF8}"/>
+              </a:ext>
+            </a:extLst>
+          </p:cNvPr>
+          <p:cNvSpPr txBox="1"/>
+          <p:nvPr/>
+        </p:nvSpPr>
+        <p:spPr>
+          <a:xfrm>
+            <a:off x="8109794" y="4177539"/>
+            <a:ext cx="907684" cy="276999"/>
+          </a:xfrm>
+          <a:prstGeom prst="rect">
+            <a:avLst/>
+          </a:prstGeom>
+          <a:noFill/>
+        </p:spPr>
+        <p:txBody>
+          <a:bodyPr wrap="none" rtlCol="0">
+            <a:spAutoFit/>
+          </a:bodyPr>
+          <a:lstStyle/>
+          <a:p>
+            <a:r>
+              <a:rPr lang="de-DE" sz="1200" dirty="0"/>
+              <a:t>pxl_data_l2</a:t>
+            </a:r>
+          </a:p>
+        </p:txBody>
+      </p:sp>
+      <p:sp>
+        <p:nvSpPr>
+          <p:cNvPr id="51" name="Textfeld 50">
+            <a:extLst>
+              <a:ext uri="{FF2B5EF4-FFF2-40B4-BE49-F238E27FC236}">
+                <a16:creationId xmlns:a16="http://schemas.microsoft.com/office/drawing/2014/main" id="{533211A5-D184-4B1F-B7B1-FC2AF19854DD}"/>
+              </a:ext>
+            </a:extLst>
+          </p:cNvPr>
+          <p:cNvSpPr txBox="1"/>
+          <p:nvPr/>
+        </p:nvSpPr>
+        <p:spPr>
+          <a:xfrm>
+            <a:off x="8109794" y="4437123"/>
+            <a:ext cx="907684" cy="276999"/>
+          </a:xfrm>
+          <a:prstGeom prst="rect">
+            <a:avLst/>
+          </a:prstGeom>
+          <a:noFill/>
+        </p:spPr>
+        <p:txBody>
+          <a:bodyPr wrap="none" rtlCol="0">
+            <a:spAutoFit/>
+          </a:bodyPr>
+          <a:lstStyle/>
+          <a:p>
+            <a:r>
+              <a:rPr lang="de-DE" sz="1200" dirty="0"/>
+              <a:t>pxl_data_l3</a:t>
+            </a:r>
+          </a:p>
+        </p:txBody>
+      </p:sp>
+      <p:sp>
+        <p:nvSpPr>
+          <p:cNvPr id="52" name="Textfeld 51">
+            <a:extLst>
+              <a:ext uri="{FF2B5EF4-FFF2-40B4-BE49-F238E27FC236}">
+                <a16:creationId xmlns:a16="http://schemas.microsoft.com/office/drawing/2014/main" id="{D5CEB09B-A5A3-4DE7-9DBA-F3DD23C98114}"/>
+              </a:ext>
+            </a:extLst>
+          </p:cNvPr>
+          <p:cNvSpPr txBox="1"/>
+          <p:nvPr/>
+        </p:nvSpPr>
+        <p:spPr>
+          <a:xfrm>
+            <a:off x="8119444" y="4712872"/>
+            <a:ext cx="907684" cy="276999"/>
+          </a:xfrm>
+          <a:prstGeom prst="rect">
+            <a:avLst/>
+          </a:prstGeom>
+          <a:noFill/>
+        </p:spPr>
+        <p:txBody>
+          <a:bodyPr wrap="none" rtlCol="0">
+            <a:spAutoFit/>
+          </a:bodyPr>
+          <a:lstStyle/>
+          <a:p>
+            <a:r>
+              <a:rPr lang="de-DE" sz="1200" dirty="0"/>
+              <a:t>pxl_data_l4</a:t>
+            </a:r>
+          </a:p>
+        </p:txBody>
+      </p:sp>
+      <p:sp>
+        <p:nvSpPr>
+          <p:cNvPr id="53" name="Textfeld 52">
+            <a:extLst>
+              <a:ext uri="{FF2B5EF4-FFF2-40B4-BE49-F238E27FC236}">
+                <a16:creationId xmlns:a16="http://schemas.microsoft.com/office/drawing/2014/main" id="{85CE26EC-8342-4998-870F-BFEF5860C772}"/>
+              </a:ext>
+            </a:extLst>
+          </p:cNvPr>
+          <p:cNvSpPr txBox="1"/>
+          <p:nvPr/>
+        </p:nvSpPr>
+        <p:spPr>
+          <a:xfrm>
+            <a:off x="8125984" y="5012412"/>
+            <a:ext cx="907684" cy="276999"/>
+          </a:xfrm>
+          <a:prstGeom prst="rect">
+            <a:avLst/>
+          </a:prstGeom>
+          <a:noFill/>
+        </p:spPr>
+        <p:txBody>
+          <a:bodyPr wrap="none" rtlCol="0">
+            <a:spAutoFit/>
+          </a:bodyPr>
+          <a:lstStyle/>
+          <a:p>
+            <a:r>
+              <a:rPr lang="de-DE" sz="1200" dirty="0"/>
+              <a:t>pxl_data_l5</a:t>
+            </a:r>
+          </a:p>
+        </p:txBody>
+      </p:sp>
+    </p:spTree>
+    <p:extLst>
+      <p:ext uri="{BB962C8B-B14F-4D97-AF65-F5344CB8AC3E}">
+        <p14:creationId xmlns:p14="http://schemas.microsoft.com/office/powerpoint/2010/main" val="3008140475"/>
       </p:ext>
     </p:extLst>
   </p:cSld>

</xml_diff>

<commit_message>
Updated doc with profs feedback
</commit_message>
<xml_diff>
--- a/Dokumentation/Stand Oster/BayerPatternVearbeitung/Grafiken.pptx
+++ b/Dokumentation/Stand Oster/BayerPatternVearbeitung/Grafiken.pptx
@@ -4787,11 +4787,9 @@
           <a:noFill/>
           <a:ln w="76200">
             <a:solidFill>
-              <a:schemeClr val="tx1">
-                <a:lumMod val="50000"/>
-                <a:lumOff val="50000"/>
-                <a:alpha val="80000"/>
-              </a:schemeClr>
+              <a:srgbClr val="FFC000">
+                <a:alpha val="89804"/>
+              </a:srgbClr>
             </a:solidFill>
           </a:ln>
         </p:spPr>
@@ -4831,13 +4829,14 @@
           </p:cNvPr>
           <p:cNvCxnSpPr>
             <a:cxnSpLocks/>
+            <a:stCxn id="17" idx="3"/>
           </p:cNvCxnSpPr>
           <p:nvPr/>
         </p:nvCxnSpPr>
         <p:spPr>
           <a:xfrm flipV="1">
-            <a:off x="2295781" y="2463190"/>
-            <a:ext cx="4353473" cy="267850"/>
+            <a:off x="2217906" y="2463191"/>
+            <a:ext cx="4431348" cy="267850"/>
           </a:xfrm>
           <a:prstGeom prst="straightConnector1">
             <a:avLst/>
@@ -4885,11 +4884,9 @@
           </a:prstGeom>
           <a:ln w="57150">
             <a:solidFill>
-              <a:schemeClr val="tx1">
-                <a:lumMod val="50000"/>
-                <a:lumOff val="50000"/>
-                <a:alpha val="80000"/>
-              </a:schemeClr>
+              <a:srgbClr val="FFC000">
+                <a:alpha val="89804"/>
+              </a:srgbClr>
             </a:solidFill>
             <a:tailEnd type="triangle"/>
           </a:ln>
@@ -6186,11 +6183,9 @@
           <a:noFill/>
           <a:ln w="76200">
             <a:solidFill>
-              <a:schemeClr val="tx1">
-                <a:lumMod val="65000"/>
-                <a:lumOff val="35000"/>
-                <a:alpha val="80000"/>
-              </a:schemeClr>
+              <a:srgbClr val="FFC000">
+                <a:alpha val="89804"/>
+              </a:srgbClr>
             </a:solidFill>
           </a:ln>
         </p:spPr>
@@ -6286,11 +6281,9 @@
           </a:prstGeom>
           <a:ln w="57150">
             <a:solidFill>
-              <a:schemeClr val="tx1">
-                <a:lumMod val="65000"/>
-                <a:lumOff val="35000"/>
-                <a:alpha val="80000"/>
-              </a:schemeClr>
+              <a:srgbClr val="FFC000">
+                <a:alpha val="89804"/>
+              </a:srgbClr>
             </a:solidFill>
             <a:tailEnd type="triangle"/>
           </a:ln>
@@ -8766,137 +8759,122 @@
           </a:prstGeom>
         </p:spPr>
       </p:pic>
-      <p:cxnSp>
-        <p:nvCxnSpPr>
-          <p:cNvPr id="67" name="Gerade Verbindung mit Pfeil 66">
-            <a:extLst>
-              <a:ext uri="{FF2B5EF4-FFF2-40B4-BE49-F238E27FC236}">
-                <a16:creationId xmlns:a16="http://schemas.microsoft.com/office/drawing/2014/main" id="{14CFEA1E-F7AA-4BA0-A1AC-A4731D9A6A77}"/>
-              </a:ext>
-            </a:extLst>
-          </p:cNvPr>
-          <p:cNvCxnSpPr/>
-          <p:nvPr/>
-        </p:nvCxnSpPr>
-        <p:spPr>
-          <a:xfrm flipV="1">
-            <a:off x="2450969" y="1989960"/>
-            <a:ext cx="3655539" cy="841018"/>
-          </a:xfrm>
-          <a:prstGeom prst="straightConnector1">
-            <a:avLst/>
-          </a:prstGeom>
-          <a:ln w="28575">
-            <a:tailEnd type="triangle"/>
-          </a:ln>
+      <p:sp>
+        <p:nvSpPr>
+          <p:cNvPr id="8" name="Textfeld 7">
+            <a:extLst>
+              <a:ext uri="{FF2B5EF4-FFF2-40B4-BE49-F238E27FC236}">
+                <a16:creationId xmlns:a16="http://schemas.microsoft.com/office/drawing/2014/main" id="{67B92286-FAA6-408B-AAA1-0C6D14B8EBC6}"/>
+              </a:ext>
+            </a:extLst>
+          </p:cNvPr>
+          <p:cNvSpPr txBox="1"/>
+          <p:nvPr/>
+        </p:nvSpPr>
+        <p:spPr>
+          <a:xfrm>
+            <a:off x="2253274" y="1613406"/>
+            <a:ext cx="1543628" cy="369332"/>
+          </a:xfrm>
+          <a:prstGeom prst="rect">
+            <a:avLst/>
+          </a:prstGeom>
+          <a:noFill/>
+        </p:spPr>
+        <p:txBody>
+          <a:bodyPr wrap="none" rtlCol="0">
+            <a:spAutoFit/>
+          </a:bodyPr>
+          <a:lstStyle/>
+          <a:p>
+            <a:r>
+              <a:rPr lang="de-DE" dirty="0"/>
+              <a:t>5x5 Byte Block</a:t>
+            </a:r>
+          </a:p>
+        </p:txBody>
+      </p:sp>
+      <p:sp>
+        <p:nvSpPr>
+          <p:cNvPr id="15" name="Pfeil: nach rechts 14">
+            <a:extLst>
+              <a:ext uri="{FF2B5EF4-FFF2-40B4-BE49-F238E27FC236}">
+                <a16:creationId xmlns:a16="http://schemas.microsoft.com/office/drawing/2014/main" id="{EA3CD5E5-B1BA-4A95-BD7F-244FD47A8975}"/>
+              </a:ext>
+            </a:extLst>
+          </p:cNvPr>
+          <p:cNvSpPr/>
+          <p:nvPr/>
+        </p:nvSpPr>
+        <p:spPr>
+          <a:xfrm>
+            <a:off x="4518026" y="3129699"/>
+            <a:ext cx="864679" cy="679816"/>
+          </a:xfrm>
+          <a:prstGeom prst="rightArrow">
+            <a:avLst/>
+          </a:prstGeom>
         </p:spPr>
         <p:style>
-          <a:lnRef idx="1">
-            <a:schemeClr val="accent1"/>
+          <a:lnRef idx="2">
+            <a:schemeClr val="accent1">
+              <a:shade val="50000"/>
+            </a:schemeClr>
           </a:lnRef>
-          <a:fillRef idx="0">
+          <a:fillRef idx="1">
             <a:schemeClr val="accent1"/>
           </a:fillRef>
           <a:effectRef idx="0">
             <a:schemeClr val="accent1"/>
           </a:effectRef>
           <a:fontRef idx="minor">
-            <a:schemeClr val="tx1"/>
+            <a:schemeClr val="lt1"/>
           </a:fontRef>
         </p:style>
-      </p:cxnSp>
-      <p:cxnSp>
-        <p:nvCxnSpPr>
-          <p:cNvPr id="68" name="Gerade Verbindung mit Pfeil 67">
-            <a:extLst>
-              <a:ext uri="{FF2B5EF4-FFF2-40B4-BE49-F238E27FC236}">
-                <a16:creationId xmlns:a16="http://schemas.microsoft.com/office/drawing/2014/main" id="{644CD79A-A409-47FB-B7CD-E1ADAFE69F43}"/>
-              </a:ext>
-            </a:extLst>
-          </p:cNvPr>
-          <p:cNvCxnSpPr>
-            <a:cxnSpLocks/>
-          </p:cNvCxnSpPr>
-          <p:nvPr/>
-        </p:nvCxnSpPr>
-        <p:spPr>
-          <a:xfrm flipV="1">
-            <a:off x="3032562" y="1989959"/>
-            <a:ext cx="4601088" cy="851449"/>
-          </a:xfrm>
-          <a:prstGeom prst="straightConnector1">
-            <a:avLst/>
-          </a:prstGeom>
-          <a:ln w="28575">
-            <a:solidFill>
-              <a:srgbClr val="4472C4">
-                <a:alpha val="80000"/>
-              </a:srgbClr>
-            </a:solidFill>
-            <a:tailEnd type="triangle"/>
-          </a:ln>
-        </p:spPr>
-        <p:style>
-          <a:lnRef idx="1">
-            <a:schemeClr val="accent1"/>
-          </a:lnRef>
-          <a:fillRef idx="0">
-            <a:schemeClr val="accent1"/>
-          </a:fillRef>
-          <a:effectRef idx="0">
-            <a:schemeClr val="accent1"/>
-          </a:effectRef>
-          <a:fontRef idx="minor">
-            <a:schemeClr val="tx1"/>
-          </a:fontRef>
-        </p:style>
-      </p:cxnSp>
-      <p:cxnSp>
-        <p:nvCxnSpPr>
-          <p:cNvPr id="71" name="Gerade Verbindung mit Pfeil 70">
-            <a:extLst>
-              <a:ext uri="{FF2B5EF4-FFF2-40B4-BE49-F238E27FC236}">
-                <a16:creationId xmlns:a16="http://schemas.microsoft.com/office/drawing/2014/main" id="{7E2FB5BE-8BEF-4958-8615-ED858963470F}"/>
-              </a:ext>
-            </a:extLst>
-          </p:cNvPr>
-          <p:cNvCxnSpPr>
-            <a:cxnSpLocks/>
-          </p:cNvCxnSpPr>
-          <p:nvPr/>
-        </p:nvCxnSpPr>
-        <p:spPr>
-          <a:xfrm flipV="1">
-            <a:off x="3649875" y="2020237"/>
-            <a:ext cx="5490273" cy="821172"/>
-          </a:xfrm>
-          <a:prstGeom prst="straightConnector1">
-            <a:avLst/>
-          </a:prstGeom>
-          <a:ln w="28575">
-            <a:solidFill>
-              <a:srgbClr val="4472C4">
-                <a:alpha val="50196"/>
-              </a:srgbClr>
-            </a:solidFill>
-            <a:tailEnd type="triangle"/>
-          </a:ln>
-        </p:spPr>
-        <p:style>
-          <a:lnRef idx="1">
-            <a:schemeClr val="accent1"/>
-          </a:lnRef>
-          <a:fillRef idx="0">
-            <a:schemeClr val="accent1"/>
-          </a:fillRef>
-          <a:effectRef idx="0">
-            <a:schemeClr val="accent1"/>
-          </a:effectRef>
-          <a:fontRef idx="minor">
-            <a:schemeClr val="tx1"/>
-          </a:fontRef>
-        </p:style>
-      </p:cxnSp>
+        <p:txBody>
+          <a:bodyPr rtlCol="0" anchor="ctr"/>
+          <a:lstStyle/>
+          <a:p>
+            <a:pPr algn="ctr"/>
+            <a:endParaRPr lang="de-DE"/>
+          </a:p>
+        </p:txBody>
+      </p:sp>
+      <p:sp>
+        <p:nvSpPr>
+          <p:cNvPr id="32" name="Textfeld 31">
+            <a:extLst>
+              <a:ext uri="{FF2B5EF4-FFF2-40B4-BE49-F238E27FC236}">
+                <a16:creationId xmlns:a16="http://schemas.microsoft.com/office/drawing/2014/main" id="{11810D5C-3ED3-4D7B-AEA7-81213FD7B3BA}"/>
+              </a:ext>
+            </a:extLst>
+          </p:cNvPr>
+          <p:cNvSpPr txBox="1"/>
+          <p:nvPr/>
+        </p:nvSpPr>
+        <p:spPr>
+          <a:xfrm>
+            <a:off x="6576541" y="941159"/>
+            <a:ext cx="2079608" cy="369332"/>
+          </a:xfrm>
+          <a:prstGeom prst="rect">
+            <a:avLst/>
+          </a:prstGeom>
+          <a:noFill/>
+        </p:spPr>
+        <p:txBody>
+          <a:bodyPr wrap="none" rtlCol="0">
+            <a:spAutoFit/>
+          </a:bodyPr>
+          <a:lstStyle/>
+          <a:p>
+            <a:r>
+              <a:rPr lang="de-DE" dirty="0"/>
+              <a:t>9 x 3 x 3 Byte Blöcke</a:t>
+            </a:r>
+          </a:p>
+        </p:txBody>
+      </p:sp>
     </p:spTree>
     <p:extLst>
       <p:ext uri="{BB962C8B-B14F-4D97-AF65-F5344CB8AC3E}">

</xml_diff>

<commit_message>
continued documentation of perske and current module
</commit_message>
<xml_diff>
--- a/Dokumentation/Stand Oster/BayerPatternVearbeitung/Grafiken.pptx
+++ b/Dokumentation/Stand Oster/BayerPatternVearbeitung/Grafiken.pptx
@@ -12,6 +12,7 @@
     <p:sldId id="260" r:id="rId6"/>
     <p:sldId id="261" r:id="rId7"/>
     <p:sldId id="262" r:id="rId8"/>
+    <p:sldId id="263" r:id="rId9"/>
   </p:sldIdLst>
   <p:sldSz cx="12192000" cy="6858000"/>
   <p:notesSz cx="6858000" cy="9144000"/>
@@ -265,7 +266,7 @@
           <a:p>
             <a:fld id="{395C48E5-9D41-460D-AEA6-338A2B2E3B37}" type="datetimeFigureOut">
               <a:rPr lang="de-DE" smtClean="0"/>
-              <a:t>06.05.2021</a:t>
+              <a:t>04.06.2021</a:t>
             </a:fld>
             <a:endParaRPr lang="de-DE"/>
           </a:p>
@@ -463,7 +464,7 @@
           <a:p>
             <a:fld id="{395C48E5-9D41-460D-AEA6-338A2B2E3B37}" type="datetimeFigureOut">
               <a:rPr lang="de-DE" smtClean="0"/>
-              <a:t>06.05.2021</a:t>
+              <a:t>04.06.2021</a:t>
             </a:fld>
             <a:endParaRPr lang="de-DE"/>
           </a:p>
@@ -671,7 +672,7 @@
           <a:p>
             <a:fld id="{395C48E5-9D41-460D-AEA6-338A2B2E3B37}" type="datetimeFigureOut">
               <a:rPr lang="de-DE" smtClean="0"/>
-              <a:t>06.05.2021</a:t>
+              <a:t>04.06.2021</a:t>
             </a:fld>
             <a:endParaRPr lang="de-DE"/>
           </a:p>
@@ -869,7 +870,7 @@
           <a:p>
             <a:fld id="{395C48E5-9D41-460D-AEA6-338A2B2E3B37}" type="datetimeFigureOut">
               <a:rPr lang="de-DE" smtClean="0"/>
-              <a:t>06.05.2021</a:t>
+              <a:t>04.06.2021</a:t>
             </a:fld>
             <a:endParaRPr lang="de-DE"/>
           </a:p>
@@ -1144,7 +1145,7 @@
           <a:p>
             <a:fld id="{395C48E5-9D41-460D-AEA6-338A2B2E3B37}" type="datetimeFigureOut">
               <a:rPr lang="de-DE" smtClean="0"/>
-              <a:t>06.05.2021</a:t>
+              <a:t>04.06.2021</a:t>
             </a:fld>
             <a:endParaRPr lang="de-DE"/>
           </a:p>
@@ -1409,7 +1410,7 @@
           <a:p>
             <a:fld id="{395C48E5-9D41-460D-AEA6-338A2B2E3B37}" type="datetimeFigureOut">
               <a:rPr lang="de-DE" smtClean="0"/>
-              <a:t>06.05.2021</a:t>
+              <a:t>04.06.2021</a:t>
             </a:fld>
             <a:endParaRPr lang="de-DE"/>
           </a:p>
@@ -1821,7 +1822,7 @@
           <a:p>
             <a:fld id="{395C48E5-9D41-460D-AEA6-338A2B2E3B37}" type="datetimeFigureOut">
               <a:rPr lang="de-DE" smtClean="0"/>
-              <a:t>06.05.2021</a:t>
+              <a:t>04.06.2021</a:t>
             </a:fld>
             <a:endParaRPr lang="de-DE"/>
           </a:p>
@@ -1962,7 +1963,7 @@
           <a:p>
             <a:fld id="{395C48E5-9D41-460D-AEA6-338A2B2E3B37}" type="datetimeFigureOut">
               <a:rPr lang="de-DE" smtClean="0"/>
-              <a:t>06.05.2021</a:t>
+              <a:t>04.06.2021</a:t>
             </a:fld>
             <a:endParaRPr lang="de-DE"/>
           </a:p>
@@ -2075,7 +2076,7 @@
           <a:p>
             <a:fld id="{395C48E5-9D41-460D-AEA6-338A2B2E3B37}" type="datetimeFigureOut">
               <a:rPr lang="de-DE" smtClean="0"/>
-              <a:t>06.05.2021</a:t>
+              <a:t>04.06.2021</a:t>
             </a:fld>
             <a:endParaRPr lang="de-DE"/>
           </a:p>
@@ -2386,7 +2387,7 @@
           <a:p>
             <a:fld id="{395C48E5-9D41-460D-AEA6-338A2B2E3B37}" type="datetimeFigureOut">
               <a:rPr lang="de-DE" smtClean="0"/>
-              <a:t>06.05.2021</a:t>
+              <a:t>04.06.2021</a:t>
             </a:fld>
             <a:endParaRPr lang="de-DE"/>
           </a:p>
@@ -2674,7 +2675,7 @@
           <a:p>
             <a:fld id="{395C48E5-9D41-460D-AEA6-338A2B2E3B37}" type="datetimeFigureOut">
               <a:rPr lang="de-DE" smtClean="0"/>
-              <a:t>06.05.2021</a:t>
+              <a:t>04.06.2021</a:t>
             </a:fld>
             <a:endParaRPr lang="de-DE"/>
           </a:p>
@@ -2915,7 +2916,7 @@
           <a:p>
             <a:fld id="{395C48E5-9D41-460D-AEA6-338A2B2E3B37}" type="datetimeFigureOut">
               <a:rPr lang="de-DE" smtClean="0"/>
-              <a:t>06.05.2021</a:t>
+              <a:t>04.06.2021</a:t>
             </a:fld>
             <a:endParaRPr lang="de-DE"/>
           </a:p>
@@ -4132,10 +4133,10 @@
       </p:grpSpPr>
       <p:sp>
         <p:nvSpPr>
-          <p:cNvPr id="2" name="Titel 1">
-            <a:extLst>
-              <a:ext uri="{FF2B5EF4-FFF2-40B4-BE49-F238E27FC236}">
-                <a16:creationId xmlns:a16="http://schemas.microsoft.com/office/drawing/2014/main" id="{1C11442E-8D46-4DBC-8962-B79FE5BBD600}"/>
+          <p:cNvPr id="4" name="Titel 1">
+            <a:extLst>
+              <a:ext uri="{FF2B5EF4-FFF2-40B4-BE49-F238E27FC236}">
+                <a16:creationId xmlns:a16="http://schemas.microsoft.com/office/drawing/2014/main" id="{16A3E64D-25A1-4426-B3AE-E1D73BE6D3F1}"/>
               </a:ext>
             </a:extLst>
           </p:cNvPr>
@@ -4146,40 +4147,1000 @@
             <p:ph type="title"/>
           </p:nvPr>
         </p:nvSpPr>
-        <p:spPr/>
+        <p:spPr>
+          <a:xfrm>
+            <a:off x="770106" y="261343"/>
+            <a:ext cx="10515600" cy="679816"/>
+          </a:xfrm>
+        </p:spPr>
         <p:txBody>
-          <a:bodyPr/>
+          <a:bodyPr>
+            <a:normAutofit fontScale="90000"/>
+          </a:bodyPr>
           <a:lstStyle/>
           <a:p>
-            <a:endParaRPr lang="de-DE"/>
+            <a:r>
+              <a:rPr lang="de-DE" dirty="0"/>
+              <a:t>Ist Zustand </a:t>
+            </a:r>
+            <a:r>
+              <a:rPr lang="de-DE" dirty="0" err="1"/>
+              <a:t>Perske</a:t>
+            </a:r>
+            <a:endParaRPr lang="de-DE" dirty="0"/>
           </a:p>
         </p:txBody>
       </p:sp>
       <p:sp>
         <p:nvSpPr>
-          <p:cNvPr id="3" name="Inhaltsplatzhalter 2">
-            <a:extLst>
-              <a:ext uri="{FF2B5EF4-FFF2-40B4-BE49-F238E27FC236}">
-                <a16:creationId xmlns:a16="http://schemas.microsoft.com/office/drawing/2014/main" id="{CD7D7F9B-825D-4812-AA35-E3B1FCBE4D89}"/>
-              </a:ext>
-            </a:extLst>
-          </p:cNvPr>
-          <p:cNvSpPr>
-            <a:spLocks noGrp="1"/>
-          </p:cNvSpPr>
-          <p:nvPr>
-            <p:ph idx="1"/>
-          </p:nvPr>
+          <p:cNvPr id="9" name="Rechteck 8">
+            <a:extLst>
+              <a:ext uri="{FF2B5EF4-FFF2-40B4-BE49-F238E27FC236}">
+                <a16:creationId xmlns:a16="http://schemas.microsoft.com/office/drawing/2014/main" id="{7B214AE2-633B-4A08-AF7B-CECB70C52377}"/>
+              </a:ext>
+            </a:extLst>
+          </p:cNvPr>
+          <p:cNvSpPr/>
+          <p:nvPr/>
         </p:nvSpPr>
-        <p:spPr/>
+        <p:spPr>
+          <a:xfrm>
+            <a:off x="1909665" y="2733869"/>
+            <a:ext cx="834759" cy="849086"/>
+          </a:xfrm>
+          <a:prstGeom prst="rect">
+            <a:avLst/>
+          </a:prstGeom>
+        </p:spPr>
+        <p:style>
+          <a:lnRef idx="2">
+            <a:schemeClr val="accent1">
+              <a:shade val="50000"/>
+            </a:schemeClr>
+          </a:lnRef>
+          <a:fillRef idx="1">
+            <a:schemeClr val="accent1"/>
+          </a:fillRef>
+          <a:effectRef idx="0">
+            <a:schemeClr val="accent1"/>
+          </a:effectRef>
+          <a:fontRef idx="minor">
+            <a:schemeClr val="lt1"/>
+          </a:fontRef>
+        </p:style>
         <p:txBody>
-          <a:bodyPr/>
+          <a:bodyPr rtlCol="0" anchor="ctr"/>
           <a:lstStyle/>
           <a:p>
-            <a:endParaRPr lang="de-DE"/>
+            <a:pPr algn="ctr"/>
+            <a:r>
+              <a:rPr lang="de-DE" sz="1200" dirty="0"/>
+              <a:t>CAM</a:t>
+            </a:r>
+            <a:br>
+              <a:rPr lang="de-DE" sz="1200" dirty="0"/>
+            </a:br>
+            <a:r>
+              <a:rPr lang="de-DE" sz="1200" dirty="0"/>
+              <a:t>Data</a:t>
+            </a:r>
+            <a:br>
+              <a:rPr lang="de-DE" sz="1200" dirty="0"/>
+            </a:br>
+            <a:r>
+              <a:rPr lang="de-DE" sz="1200" dirty="0" err="1"/>
+              <a:t>Mux</a:t>
+            </a:r>
+            <a:endParaRPr lang="de-DE" sz="1200" dirty="0"/>
           </a:p>
         </p:txBody>
       </p:sp>
+      <p:sp>
+        <p:nvSpPr>
+          <p:cNvPr id="10" name="Rechteck 9">
+            <a:extLst>
+              <a:ext uri="{FF2B5EF4-FFF2-40B4-BE49-F238E27FC236}">
+                <a16:creationId xmlns:a16="http://schemas.microsoft.com/office/drawing/2014/main" id="{D76C4116-65D3-4E66-A4D6-CDD1C1F561FC}"/>
+              </a:ext>
+            </a:extLst>
+          </p:cNvPr>
+          <p:cNvSpPr/>
+          <p:nvPr/>
+        </p:nvSpPr>
+        <p:spPr>
+          <a:xfrm>
+            <a:off x="3032693" y="2733869"/>
+            <a:ext cx="834759" cy="849086"/>
+          </a:xfrm>
+          <a:prstGeom prst="rect">
+            <a:avLst/>
+          </a:prstGeom>
+        </p:spPr>
+        <p:style>
+          <a:lnRef idx="2">
+            <a:schemeClr val="accent1">
+              <a:shade val="50000"/>
+            </a:schemeClr>
+          </a:lnRef>
+          <a:fillRef idx="1">
+            <a:schemeClr val="accent1"/>
+          </a:fillRef>
+          <a:effectRef idx="0">
+            <a:schemeClr val="accent1"/>
+          </a:effectRef>
+          <a:fontRef idx="minor">
+            <a:schemeClr val="lt1"/>
+          </a:fontRef>
+        </p:style>
+        <p:txBody>
+          <a:bodyPr rtlCol="0" anchor="ctr"/>
+          <a:lstStyle/>
+          <a:p>
+            <a:pPr algn="ctr"/>
+            <a:r>
+              <a:rPr lang="de-DE" sz="1200" dirty="0"/>
+              <a:t>SDRAM</a:t>
+            </a:r>
+            <a:br>
+              <a:rPr lang="de-DE" sz="1200" dirty="0"/>
+            </a:br>
+            <a:r>
+              <a:rPr lang="de-DE" sz="1200" dirty="0"/>
+              <a:t>Write</a:t>
+            </a:r>
+            <a:br>
+              <a:rPr lang="de-DE" sz="1200" dirty="0"/>
+            </a:br>
+            <a:r>
+              <a:rPr lang="de-DE" sz="1200" dirty="0"/>
+              <a:t>Buffer</a:t>
+            </a:r>
+          </a:p>
+        </p:txBody>
+      </p:sp>
+      <p:sp>
+        <p:nvSpPr>
+          <p:cNvPr id="11" name="Rechteck 10">
+            <a:extLst>
+              <a:ext uri="{FF2B5EF4-FFF2-40B4-BE49-F238E27FC236}">
+                <a16:creationId xmlns:a16="http://schemas.microsoft.com/office/drawing/2014/main" id="{67DE0F21-EB95-4500-B170-7F55127783DC}"/>
+              </a:ext>
+            </a:extLst>
+          </p:cNvPr>
+          <p:cNvSpPr/>
+          <p:nvPr/>
+        </p:nvSpPr>
+        <p:spPr>
+          <a:xfrm>
+            <a:off x="4198377" y="2733869"/>
+            <a:ext cx="834759" cy="849086"/>
+          </a:xfrm>
+          <a:prstGeom prst="rect">
+            <a:avLst/>
+          </a:prstGeom>
+        </p:spPr>
+        <p:style>
+          <a:lnRef idx="2">
+            <a:schemeClr val="accent1">
+              <a:shade val="50000"/>
+            </a:schemeClr>
+          </a:lnRef>
+          <a:fillRef idx="1">
+            <a:schemeClr val="accent1"/>
+          </a:fillRef>
+          <a:effectRef idx="0">
+            <a:schemeClr val="accent1"/>
+          </a:effectRef>
+          <a:fontRef idx="minor">
+            <a:schemeClr val="lt1"/>
+          </a:fontRef>
+        </p:style>
+        <p:txBody>
+          <a:bodyPr rtlCol="0" anchor="ctr"/>
+          <a:lstStyle/>
+          <a:p>
+            <a:pPr algn="ctr"/>
+            <a:r>
+              <a:rPr lang="de-DE" sz="1200" dirty="0"/>
+              <a:t>SDRAM</a:t>
+            </a:r>
+            <a:br>
+              <a:rPr lang="de-DE" sz="1200" dirty="0"/>
+            </a:br>
+            <a:r>
+              <a:rPr lang="de-DE" sz="1200" dirty="0" err="1"/>
+              <a:t>Controler</a:t>
+            </a:r>
+            <a:endParaRPr lang="de-DE" sz="1200" dirty="0"/>
+          </a:p>
+        </p:txBody>
+      </p:sp>
+      <p:sp>
+        <p:nvSpPr>
+          <p:cNvPr id="12" name="Rechteck 11">
+            <a:extLst>
+              <a:ext uri="{FF2B5EF4-FFF2-40B4-BE49-F238E27FC236}">
+                <a16:creationId xmlns:a16="http://schemas.microsoft.com/office/drawing/2014/main" id="{503E643E-F422-46C7-9358-46C9736D2E3E}"/>
+              </a:ext>
+            </a:extLst>
+          </p:cNvPr>
+          <p:cNvSpPr/>
+          <p:nvPr/>
+        </p:nvSpPr>
+        <p:spPr>
+          <a:xfrm>
+            <a:off x="4198377" y="1563496"/>
+            <a:ext cx="834759" cy="849086"/>
+          </a:xfrm>
+          <a:prstGeom prst="rect">
+            <a:avLst/>
+          </a:prstGeom>
+        </p:spPr>
+        <p:style>
+          <a:lnRef idx="2">
+            <a:schemeClr val="accent1">
+              <a:shade val="50000"/>
+            </a:schemeClr>
+          </a:lnRef>
+          <a:fillRef idx="1">
+            <a:schemeClr val="accent1"/>
+          </a:fillRef>
+          <a:effectRef idx="0">
+            <a:schemeClr val="accent1"/>
+          </a:effectRef>
+          <a:fontRef idx="minor">
+            <a:schemeClr val="lt1"/>
+          </a:fontRef>
+        </p:style>
+        <p:txBody>
+          <a:bodyPr rtlCol="0" anchor="ctr"/>
+          <a:lstStyle/>
+          <a:p>
+            <a:pPr algn="ctr"/>
+            <a:r>
+              <a:rPr lang="de-DE" sz="1200" dirty="0"/>
+              <a:t>Memory</a:t>
+            </a:r>
+            <a:br>
+              <a:rPr lang="de-DE" sz="1200" dirty="0"/>
+            </a:br>
+            <a:r>
+              <a:rPr lang="de-DE" sz="1200" dirty="0"/>
+              <a:t>Access</a:t>
+            </a:r>
+            <a:br>
+              <a:rPr lang="de-DE" sz="1200" dirty="0"/>
+            </a:br>
+            <a:r>
+              <a:rPr lang="de-DE" sz="1200" dirty="0"/>
+              <a:t>Control</a:t>
+            </a:r>
+          </a:p>
+        </p:txBody>
+      </p:sp>
+      <p:sp>
+        <p:nvSpPr>
+          <p:cNvPr id="13" name="Rechteck 12">
+            <a:extLst>
+              <a:ext uri="{FF2B5EF4-FFF2-40B4-BE49-F238E27FC236}">
+                <a16:creationId xmlns:a16="http://schemas.microsoft.com/office/drawing/2014/main" id="{9CB412B5-0B8B-423E-8979-8747583C3B4B}"/>
+              </a:ext>
+            </a:extLst>
+          </p:cNvPr>
+          <p:cNvSpPr/>
+          <p:nvPr/>
+        </p:nvSpPr>
+        <p:spPr>
+          <a:xfrm>
+            <a:off x="5364061" y="2733869"/>
+            <a:ext cx="834759" cy="849086"/>
+          </a:xfrm>
+          <a:prstGeom prst="rect">
+            <a:avLst/>
+          </a:prstGeom>
+        </p:spPr>
+        <p:style>
+          <a:lnRef idx="2">
+            <a:schemeClr val="accent1">
+              <a:shade val="50000"/>
+            </a:schemeClr>
+          </a:lnRef>
+          <a:fillRef idx="1">
+            <a:schemeClr val="accent1"/>
+          </a:fillRef>
+          <a:effectRef idx="0">
+            <a:schemeClr val="accent1"/>
+          </a:effectRef>
+          <a:fontRef idx="minor">
+            <a:schemeClr val="lt1"/>
+          </a:fontRef>
+        </p:style>
+        <p:txBody>
+          <a:bodyPr rtlCol="0" anchor="ctr"/>
+          <a:lstStyle/>
+          <a:p>
+            <a:pPr algn="ctr"/>
+            <a:r>
+              <a:rPr lang="de-DE" sz="1200" dirty="0"/>
+              <a:t>SDRAM</a:t>
+            </a:r>
+            <a:br>
+              <a:rPr lang="de-DE" sz="1200" dirty="0"/>
+            </a:br>
+            <a:r>
+              <a:rPr lang="de-DE" sz="1200" dirty="0"/>
+              <a:t>Read</a:t>
+            </a:r>
+            <a:br>
+              <a:rPr lang="de-DE" sz="1200" dirty="0"/>
+            </a:br>
+            <a:r>
+              <a:rPr lang="de-DE" sz="1200" dirty="0"/>
+              <a:t>Buffer</a:t>
+            </a:r>
+          </a:p>
+        </p:txBody>
+      </p:sp>
+      <p:sp>
+        <p:nvSpPr>
+          <p:cNvPr id="8" name="Textfeld 7">
+            <a:extLst>
+              <a:ext uri="{FF2B5EF4-FFF2-40B4-BE49-F238E27FC236}">
+                <a16:creationId xmlns:a16="http://schemas.microsoft.com/office/drawing/2014/main" id="{64638BB4-9E84-4ABF-B41F-0C94E079A970}"/>
+              </a:ext>
+            </a:extLst>
+          </p:cNvPr>
+          <p:cNvSpPr txBox="1"/>
+          <p:nvPr/>
+        </p:nvSpPr>
+        <p:spPr>
+          <a:xfrm>
+            <a:off x="940424" y="2973746"/>
+            <a:ext cx="638316" cy="369332"/>
+          </a:xfrm>
+          <a:prstGeom prst="rect">
+            <a:avLst/>
+          </a:prstGeom>
+          <a:noFill/>
+        </p:spPr>
+        <p:txBody>
+          <a:bodyPr wrap="none" rtlCol="0">
+            <a:spAutoFit/>
+          </a:bodyPr>
+          <a:lstStyle/>
+          <a:p>
+            <a:r>
+              <a:rPr lang="de-DE" dirty="0"/>
+              <a:t>CAM</a:t>
+            </a:r>
+          </a:p>
+        </p:txBody>
+      </p:sp>
+      <p:sp>
+        <p:nvSpPr>
+          <p:cNvPr id="16" name="Textfeld 15">
+            <a:extLst>
+              <a:ext uri="{FF2B5EF4-FFF2-40B4-BE49-F238E27FC236}">
+                <a16:creationId xmlns:a16="http://schemas.microsoft.com/office/drawing/2014/main" id="{9FEBA017-927E-4F0E-A6C5-BE7A66BA969B}"/>
+              </a:ext>
+            </a:extLst>
+          </p:cNvPr>
+          <p:cNvSpPr txBox="1"/>
+          <p:nvPr/>
+        </p:nvSpPr>
+        <p:spPr>
+          <a:xfrm>
+            <a:off x="5404436" y="4443614"/>
+            <a:ext cx="592213" cy="369332"/>
+          </a:xfrm>
+          <a:prstGeom prst="rect">
+            <a:avLst/>
+          </a:prstGeom>
+          <a:noFill/>
+        </p:spPr>
+        <p:txBody>
+          <a:bodyPr wrap="none" rtlCol="0">
+            <a:spAutoFit/>
+          </a:bodyPr>
+          <a:lstStyle/>
+          <a:p>
+            <a:r>
+              <a:rPr lang="de-DE" dirty="0"/>
+              <a:t>VGA</a:t>
+            </a:r>
+          </a:p>
+        </p:txBody>
+      </p:sp>
+      <p:sp>
+        <p:nvSpPr>
+          <p:cNvPr id="18" name="Rechteck 17">
+            <a:extLst>
+              <a:ext uri="{FF2B5EF4-FFF2-40B4-BE49-F238E27FC236}">
+                <a16:creationId xmlns:a16="http://schemas.microsoft.com/office/drawing/2014/main" id="{DE524476-446D-4491-8961-2687BC4C4C5D}"/>
+              </a:ext>
+            </a:extLst>
+          </p:cNvPr>
+          <p:cNvSpPr/>
+          <p:nvPr/>
+        </p:nvSpPr>
+        <p:spPr>
+          <a:xfrm>
+            <a:off x="1909665" y="4205292"/>
+            <a:ext cx="834759" cy="849086"/>
+          </a:xfrm>
+          <a:prstGeom prst="rect">
+            <a:avLst/>
+          </a:prstGeom>
+        </p:spPr>
+        <p:style>
+          <a:lnRef idx="2">
+            <a:schemeClr val="accent1">
+              <a:shade val="50000"/>
+            </a:schemeClr>
+          </a:lnRef>
+          <a:fillRef idx="1">
+            <a:schemeClr val="accent1"/>
+          </a:fillRef>
+          <a:effectRef idx="0">
+            <a:schemeClr val="accent1"/>
+          </a:effectRef>
+          <a:fontRef idx="minor">
+            <a:schemeClr val="lt1"/>
+          </a:fontRef>
+        </p:style>
+        <p:txBody>
+          <a:bodyPr rtlCol="0" anchor="ctr"/>
+          <a:lstStyle/>
+          <a:p>
+            <a:pPr algn="ctr"/>
+            <a:r>
+              <a:rPr lang="de-DE" sz="1200" dirty="0"/>
+              <a:t>SDRAM</a:t>
+            </a:r>
+            <a:br>
+              <a:rPr lang="de-DE" sz="1200" dirty="0"/>
+            </a:br>
+            <a:r>
+              <a:rPr lang="de-DE" sz="1200" dirty="0"/>
+              <a:t>Pixel</a:t>
+            </a:r>
+            <a:br>
+              <a:rPr lang="de-DE" sz="1200" dirty="0"/>
+            </a:br>
+            <a:r>
+              <a:rPr lang="de-DE" sz="1200" dirty="0"/>
+              <a:t>Buffer</a:t>
+            </a:r>
+          </a:p>
+        </p:txBody>
+      </p:sp>
+      <p:sp>
+        <p:nvSpPr>
+          <p:cNvPr id="21" name="Rechteck 20">
+            <a:extLst>
+              <a:ext uri="{FF2B5EF4-FFF2-40B4-BE49-F238E27FC236}">
+                <a16:creationId xmlns:a16="http://schemas.microsoft.com/office/drawing/2014/main" id="{53964735-72AE-43BA-A3EE-9E69C9C536BA}"/>
+              </a:ext>
+            </a:extLst>
+          </p:cNvPr>
+          <p:cNvSpPr/>
+          <p:nvPr/>
+        </p:nvSpPr>
+        <p:spPr>
+          <a:xfrm>
+            <a:off x="3038839" y="4205292"/>
+            <a:ext cx="834759" cy="849086"/>
+          </a:xfrm>
+          <a:prstGeom prst="rect">
+            <a:avLst/>
+          </a:prstGeom>
+        </p:spPr>
+        <p:style>
+          <a:lnRef idx="2">
+            <a:schemeClr val="accent1">
+              <a:shade val="50000"/>
+            </a:schemeClr>
+          </a:lnRef>
+          <a:fillRef idx="1">
+            <a:schemeClr val="accent1"/>
+          </a:fillRef>
+          <a:effectRef idx="0">
+            <a:schemeClr val="accent1"/>
+          </a:effectRef>
+          <a:fontRef idx="minor">
+            <a:schemeClr val="lt1"/>
+          </a:fontRef>
+        </p:style>
+        <p:txBody>
+          <a:bodyPr rtlCol="0" anchor="ctr"/>
+          <a:lstStyle/>
+          <a:p>
+            <a:pPr algn="ctr"/>
+            <a:r>
+              <a:rPr lang="de-DE" sz="1200" dirty="0" err="1"/>
+              <a:t>Debay</a:t>
+            </a:r>
+            <a:endParaRPr lang="de-DE" sz="1200" dirty="0"/>
+          </a:p>
+        </p:txBody>
+      </p:sp>
+      <p:sp>
+        <p:nvSpPr>
+          <p:cNvPr id="22" name="Rechteck 21">
+            <a:extLst>
+              <a:ext uri="{FF2B5EF4-FFF2-40B4-BE49-F238E27FC236}">
+                <a16:creationId xmlns:a16="http://schemas.microsoft.com/office/drawing/2014/main" id="{CF91810D-F6D1-43C5-ADB1-A199AB9AEDD3}"/>
+              </a:ext>
+            </a:extLst>
+          </p:cNvPr>
+          <p:cNvSpPr/>
+          <p:nvPr/>
+        </p:nvSpPr>
+        <p:spPr>
+          <a:xfrm>
+            <a:off x="4176282" y="4205292"/>
+            <a:ext cx="834759" cy="849086"/>
+          </a:xfrm>
+          <a:prstGeom prst="rect">
+            <a:avLst/>
+          </a:prstGeom>
+        </p:spPr>
+        <p:style>
+          <a:lnRef idx="2">
+            <a:schemeClr val="accent1">
+              <a:shade val="50000"/>
+            </a:schemeClr>
+          </a:lnRef>
+          <a:fillRef idx="1">
+            <a:schemeClr val="accent1"/>
+          </a:fillRef>
+          <a:effectRef idx="0">
+            <a:schemeClr val="accent1"/>
+          </a:effectRef>
+          <a:fontRef idx="minor">
+            <a:schemeClr val="lt1"/>
+          </a:fontRef>
+        </p:style>
+        <p:txBody>
+          <a:bodyPr rtlCol="0" anchor="ctr"/>
+          <a:lstStyle/>
+          <a:p>
+            <a:pPr algn="ctr"/>
+            <a:r>
+              <a:rPr lang="de-DE" sz="1200" dirty="0" err="1"/>
+              <a:t>Convo-lution</a:t>
+            </a:r>
+            <a:endParaRPr lang="de-DE" sz="1200" dirty="0"/>
+          </a:p>
+        </p:txBody>
+      </p:sp>
+      <p:cxnSp>
+        <p:nvCxnSpPr>
+          <p:cNvPr id="23" name="Gerade Verbindung mit Pfeil 22">
+            <a:extLst>
+              <a:ext uri="{FF2B5EF4-FFF2-40B4-BE49-F238E27FC236}">
+                <a16:creationId xmlns:a16="http://schemas.microsoft.com/office/drawing/2014/main" id="{D9C23501-432F-4825-B383-C2914EE485E6}"/>
+              </a:ext>
+            </a:extLst>
+          </p:cNvPr>
+          <p:cNvCxnSpPr>
+            <a:stCxn id="8" idx="3"/>
+            <a:endCxn id="9" idx="1"/>
+          </p:cNvCxnSpPr>
+          <p:nvPr/>
+        </p:nvCxnSpPr>
+        <p:spPr>
+          <a:xfrm>
+            <a:off x="1578740" y="3158412"/>
+            <a:ext cx="330925" cy="0"/>
+          </a:xfrm>
+          <a:prstGeom prst="straightConnector1">
+            <a:avLst/>
+          </a:prstGeom>
+          <a:ln>
+            <a:tailEnd type="triangle"/>
+          </a:ln>
+        </p:spPr>
+        <p:style>
+          <a:lnRef idx="1">
+            <a:schemeClr val="accent1"/>
+          </a:lnRef>
+          <a:fillRef idx="0">
+            <a:schemeClr val="accent1"/>
+          </a:fillRef>
+          <a:effectRef idx="0">
+            <a:schemeClr val="accent1"/>
+          </a:effectRef>
+          <a:fontRef idx="minor">
+            <a:schemeClr val="tx1"/>
+          </a:fontRef>
+        </p:style>
+      </p:cxnSp>
+      <p:cxnSp>
+        <p:nvCxnSpPr>
+          <p:cNvPr id="25" name="Gerade Verbindung mit Pfeil 24">
+            <a:extLst>
+              <a:ext uri="{FF2B5EF4-FFF2-40B4-BE49-F238E27FC236}">
+                <a16:creationId xmlns:a16="http://schemas.microsoft.com/office/drawing/2014/main" id="{5454FA44-9F10-4511-9538-45A9A3C72478}"/>
+              </a:ext>
+            </a:extLst>
+          </p:cNvPr>
+          <p:cNvCxnSpPr>
+            <a:stCxn id="9" idx="3"/>
+            <a:endCxn id="10" idx="1"/>
+          </p:cNvCxnSpPr>
+          <p:nvPr/>
+        </p:nvCxnSpPr>
+        <p:spPr>
+          <a:xfrm>
+            <a:off x="2744424" y="3158412"/>
+            <a:ext cx="288269" cy="0"/>
+          </a:xfrm>
+          <a:prstGeom prst="straightConnector1">
+            <a:avLst/>
+          </a:prstGeom>
+          <a:ln>
+            <a:tailEnd type="triangle"/>
+          </a:ln>
+        </p:spPr>
+        <p:style>
+          <a:lnRef idx="1">
+            <a:schemeClr val="accent1"/>
+          </a:lnRef>
+          <a:fillRef idx="0">
+            <a:schemeClr val="accent1"/>
+          </a:fillRef>
+          <a:effectRef idx="0">
+            <a:schemeClr val="accent1"/>
+          </a:effectRef>
+          <a:fontRef idx="minor">
+            <a:schemeClr val="tx1"/>
+          </a:fontRef>
+        </p:style>
+      </p:cxnSp>
+      <p:cxnSp>
+        <p:nvCxnSpPr>
+          <p:cNvPr id="27" name="Gerade Verbindung mit Pfeil 26">
+            <a:extLst>
+              <a:ext uri="{FF2B5EF4-FFF2-40B4-BE49-F238E27FC236}">
+                <a16:creationId xmlns:a16="http://schemas.microsoft.com/office/drawing/2014/main" id="{16552561-AE64-4607-9564-90EAC045B182}"/>
+              </a:ext>
+            </a:extLst>
+          </p:cNvPr>
+          <p:cNvCxnSpPr>
+            <a:stCxn id="10" idx="3"/>
+            <a:endCxn id="11" idx="1"/>
+          </p:cNvCxnSpPr>
+          <p:nvPr/>
+        </p:nvCxnSpPr>
+        <p:spPr>
+          <a:xfrm>
+            <a:off x="3867452" y="3158412"/>
+            <a:ext cx="330925" cy="0"/>
+          </a:xfrm>
+          <a:prstGeom prst="straightConnector1">
+            <a:avLst/>
+          </a:prstGeom>
+          <a:ln>
+            <a:tailEnd type="triangle"/>
+          </a:ln>
+        </p:spPr>
+        <p:style>
+          <a:lnRef idx="1">
+            <a:schemeClr val="accent1"/>
+          </a:lnRef>
+          <a:fillRef idx="0">
+            <a:schemeClr val="accent1"/>
+          </a:fillRef>
+          <a:effectRef idx="0">
+            <a:schemeClr val="accent1"/>
+          </a:effectRef>
+          <a:fontRef idx="minor">
+            <a:schemeClr val="tx1"/>
+          </a:fontRef>
+        </p:style>
+      </p:cxnSp>
+      <p:cxnSp>
+        <p:nvCxnSpPr>
+          <p:cNvPr id="29" name="Gerade Verbindung mit Pfeil 28">
+            <a:extLst>
+              <a:ext uri="{FF2B5EF4-FFF2-40B4-BE49-F238E27FC236}">
+                <a16:creationId xmlns:a16="http://schemas.microsoft.com/office/drawing/2014/main" id="{541153BC-3271-4125-8531-B1126261CEA5}"/>
+              </a:ext>
+            </a:extLst>
+          </p:cNvPr>
+          <p:cNvCxnSpPr>
+            <a:stCxn id="11" idx="3"/>
+            <a:endCxn id="13" idx="1"/>
+          </p:cNvCxnSpPr>
+          <p:nvPr/>
+        </p:nvCxnSpPr>
+        <p:spPr>
+          <a:xfrm>
+            <a:off x="5033136" y="3158412"/>
+            <a:ext cx="330925" cy="0"/>
+          </a:xfrm>
+          <a:prstGeom prst="straightConnector1">
+            <a:avLst/>
+          </a:prstGeom>
+          <a:ln>
+            <a:tailEnd type="triangle"/>
+          </a:ln>
+        </p:spPr>
+        <p:style>
+          <a:lnRef idx="1">
+            <a:schemeClr val="accent1"/>
+          </a:lnRef>
+          <a:fillRef idx="0">
+            <a:schemeClr val="accent1"/>
+          </a:fillRef>
+          <a:effectRef idx="0">
+            <a:schemeClr val="accent1"/>
+          </a:effectRef>
+          <a:fontRef idx="minor">
+            <a:schemeClr val="tx1"/>
+          </a:fontRef>
+        </p:style>
+      </p:cxnSp>
+      <p:cxnSp>
+        <p:nvCxnSpPr>
+          <p:cNvPr id="33" name="Verbinder: gewinkelt 32">
+            <a:extLst>
+              <a:ext uri="{FF2B5EF4-FFF2-40B4-BE49-F238E27FC236}">
+                <a16:creationId xmlns:a16="http://schemas.microsoft.com/office/drawing/2014/main" id="{F67B0C5F-0367-45A4-A569-91874D8F66BF}"/>
+              </a:ext>
+            </a:extLst>
+          </p:cNvPr>
+          <p:cNvCxnSpPr>
+            <a:cxnSpLocks/>
+            <a:stCxn id="13" idx="2"/>
+            <a:endCxn id="18" idx="1"/>
+          </p:cNvCxnSpPr>
+          <p:nvPr/>
+        </p:nvCxnSpPr>
+        <p:spPr>
+          <a:xfrm rot="5400000">
+            <a:off x="3322113" y="2170507"/>
+            <a:ext cx="1046880" cy="3871776"/>
+          </a:xfrm>
+          <a:prstGeom prst="bentConnector4">
+            <a:avLst>
+              <a:gd name="adj1" fmla="val 29723"/>
+              <a:gd name="adj2" fmla="val 105904"/>
+            </a:avLst>
+          </a:prstGeom>
+          <a:ln>
+            <a:tailEnd type="triangle"/>
+          </a:ln>
+        </p:spPr>
+        <p:style>
+          <a:lnRef idx="1">
+            <a:schemeClr val="accent1"/>
+          </a:lnRef>
+          <a:fillRef idx="0">
+            <a:schemeClr val="accent1"/>
+          </a:fillRef>
+          <a:effectRef idx="0">
+            <a:schemeClr val="accent1"/>
+          </a:effectRef>
+          <a:fontRef idx="minor">
+            <a:schemeClr val="tx1"/>
+          </a:fontRef>
+        </p:style>
+      </p:cxnSp>
+      <p:cxnSp>
+        <p:nvCxnSpPr>
+          <p:cNvPr id="37" name="Gerade Verbindung mit Pfeil 36">
+            <a:extLst>
+              <a:ext uri="{FF2B5EF4-FFF2-40B4-BE49-F238E27FC236}">
+                <a16:creationId xmlns:a16="http://schemas.microsoft.com/office/drawing/2014/main" id="{0911CA8E-4F68-4FE0-B97F-1AA00CAB9472}"/>
+              </a:ext>
+            </a:extLst>
+          </p:cNvPr>
+          <p:cNvCxnSpPr>
+            <a:stCxn id="18" idx="3"/>
+            <a:endCxn id="21" idx="1"/>
+          </p:cNvCxnSpPr>
+          <p:nvPr/>
+        </p:nvCxnSpPr>
+        <p:spPr>
+          <a:xfrm>
+            <a:off x="2744424" y="4629835"/>
+            <a:ext cx="294415" cy="0"/>
+          </a:xfrm>
+          <a:prstGeom prst="straightConnector1">
+            <a:avLst/>
+          </a:prstGeom>
+          <a:ln>
+            <a:tailEnd type="triangle"/>
+          </a:ln>
+        </p:spPr>
+        <p:style>
+          <a:lnRef idx="1">
+            <a:schemeClr val="accent1"/>
+          </a:lnRef>
+          <a:fillRef idx="0">
+            <a:schemeClr val="accent1"/>
+          </a:fillRef>
+          <a:effectRef idx="0">
+            <a:schemeClr val="accent1"/>
+          </a:effectRef>
+          <a:fontRef idx="minor">
+            <a:schemeClr val="tx1"/>
+          </a:fontRef>
+        </p:style>
+      </p:cxnSp>
+      <p:cxnSp>
+        <p:nvCxnSpPr>
+          <p:cNvPr id="39" name="Gerade Verbindung mit Pfeil 38">
+            <a:extLst>
+              <a:ext uri="{FF2B5EF4-FFF2-40B4-BE49-F238E27FC236}">
+                <a16:creationId xmlns:a16="http://schemas.microsoft.com/office/drawing/2014/main" id="{49482D0D-06D1-4D7F-B23E-3F800660975D}"/>
+              </a:ext>
+            </a:extLst>
+          </p:cNvPr>
+          <p:cNvCxnSpPr>
+            <a:cxnSpLocks/>
+            <a:stCxn id="21" idx="3"/>
+            <a:endCxn id="22" idx="1"/>
+          </p:cNvCxnSpPr>
+          <p:nvPr/>
+        </p:nvCxnSpPr>
+        <p:spPr>
+          <a:xfrm>
+            <a:off x="3873598" y="4629835"/>
+            <a:ext cx="302684" cy="0"/>
+          </a:xfrm>
+          <a:prstGeom prst="straightConnector1">
+            <a:avLst/>
+          </a:prstGeom>
+          <a:ln>
+            <a:tailEnd type="triangle"/>
+          </a:ln>
+        </p:spPr>
+        <p:style>
+          <a:lnRef idx="1">
+            <a:schemeClr val="accent1"/>
+          </a:lnRef>
+          <a:fillRef idx="0">
+            <a:schemeClr val="accent1"/>
+          </a:fillRef>
+          <a:effectRef idx="0">
+            <a:schemeClr val="accent1"/>
+          </a:effectRef>
+          <a:fontRef idx="minor">
+            <a:schemeClr val="tx1"/>
+          </a:fontRef>
+        </p:style>
+      </p:cxnSp>
+      <p:cxnSp>
+        <p:nvCxnSpPr>
+          <p:cNvPr id="41" name="Gerade Verbindung mit Pfeil 40">
+            <a:extLst>
+              <a:ext uri="{FF2B5EF4-FFF2-40B4-BE49-F238E27FC236}">
+                <a16:creationId xmlns:a16="http://schemas.microsoft.com/office/drawing/2014/main" id="{8293AEC5-CBA3-43A2-9BEC-16A19B08DB15}"/>
+              </a:ext>
+            </a:extLst>
+          </p:cNvPr>
+          <p:cNvCxnSpPr>
+            <a:stCxn id="22" idx="3"/>
+            <a:endCxn id="16" idx="1"/>
+          </p:cNvCxnSpPr>
+          <p:nvPr/>
+        </p:nvCxnSpPr>
+        <p:spPr>
+          <a:xfrm flipV="1">
+            <a:off x="5011041" y="4628280"/>
+            <a:ext cx="393395" cy="1555"/>
+          </a:xfrm>
+          <a:prstGeom prst="straightConnector1">
+            <a:avLst/>
+          </a:prstGeom>
+          <a:ln>
+            <a:tailEnd type="triangle"/>
+          </a:ln>
+        </p:spPr>
+        <p:style>
+          <a:lnRef idx="1">
+            <a:schemeClr val="accent1"/>
+          </a:lnRef>
+          <a:fillRef idx="0">
+            <a:schemeClr val="accent1"/>
+          </a:fillRef>
+          <a:effectRef idx="0">
+            <a:schemeClr val="accent1"/>
+          </a:effectRef>
+          <a:fontRef idx="minor">
+            <a:schemeClr val="tx1"/>
+          </a:fontRef>
+        </p:style>
+      </p:cxnSp>
+      <p:cxnSp>
+        <p:nvCxnSpPr>
+          <p:cNvPr id="44" name="Verbinder: gewinkelt 43">
+            <a:extLst>
+              <a:ext uri="{FF2B5EF4-FFF2-40B4-BE49-F238E27FC236}">
+                <a16:creationId xmlns:a16="http://schemas.microsoft.com/office/drawing/2014/main" id="{04093F6E-2DA9-42FF-8674-FADA36A296A1}"/>
+              </a:ext>
+            </a:extLst>
+          </p:cNvPr>
+          <p:cNvCxnSpPr>
+            <a:stCxn id="10" idx="0"/>
+            <a:endCxn id="12" idx="1"/>
+          </p:cNvCxnSpPr>
+          <p:nvPr/>
+        </p:nvCxnSpPr>
+        <p:spPr>
+          <a:xfrm rot="5400000" flipH="1" flipV="1">
+            <a:off x="3451310" y="1986802"/>
+            <a:ext cx="745830" cy="748304"/>
+          </a:xfrm>
+          <a:prstGeom prst="bentConnector2">
+            <a:avLst/>
+          </a:prstGeom>
+          <a:ln>
+            <a:headEnd type="triangle"/>
+            <a:tailEnd type="triangle"/>
+          </a:ln>
+        </p:spPr>
+        <p:style>
+          <a:lnRef idx="1">
+            <a:schemeClr val="accent1"/>
+          </a:lnRef>
+          <a:fillRef idx="0">
+            <a:schemeClr val="accent1"/>
+          </a:fillRef>
+          <a:effectRef idx="0">
+            <a:schemeClr val="accent1"/>
+          </a:effectRef>
+          <a:fontRef idx="minor">
+            <a:schemeClr val="tx1"/>
+          </a:fontRef>
+        </p:style>
+      </p:cxnSp>
+      <p:cxnSp>
+        <p:nvCxnSpPr>
+          <p:cNvPr id="46" name="Verbinder: gewinkelt 45">
+            <a:extLst>
+              <a:ext uri="{FF2B5EF4-FFF2-40B4-BE49-F238E27FC236}">
+                <a16:creationId xmlns:a16="http://schemas.microsoft.com/office/drawing/2014/main" id="{D3143B2A-51D1-4C72-868D-ACAF7C443F9A}"/>
+              </a:ext>
+            </a:extLst>
+          </p:cNvPr>
+          <p:cNvCxnSpPr>
+            <a:stCxn id="12" idx="3"/>
+            <a:endCxn id="13" idx="0"/>
+          </p:cNvCxnSpPr>
+          <p:nvPr/>
+        </p:nvCxnSpPr>
+        <p:spPr>
+          <a:xfrm>
+            <a:off x="5033136" y="1988039"/>
+            <a:ext cx="748305" cy="745830"/>
+          </a:xfrm>
+          <a:prstGeom prst="bentConnector2">
+            <a:avLst/>
+          </a:prstGeom>
+          <a:ln>
+            <a:headEnd type="triangle"/>
+            <a:tailEnd type="triangle"/>
+          </a:ln>
+        </p:spPr>
+        <p:style>
+          <a:lnRef idx="1">
+            <a:schemeClr val="accent1"/>
+          </a:lnRef>
+          <a:fillRef idx="0">
+            <a:schemeClr val="accent1"/>
+          </a:fillRef>
+          <a:effectRef idx="0">
+            <a:schemeClr val="accent1"/>
+          </a:effectRef>
+          <a:fontRef idx="minor">
+            <a:schemeClr val="tx1"/>
+          </a:fontRef>
+        </p:style>
+      </p:cxnSp>
     </p:spTree>
     <p:extLst>
       <p:ext uri="{BB962C8B-B14F-4D97-AF65-F5344CB8AC3E}">
@@ -12249,6 +13210,36 @@
     <p:extLst>
       <p:ext uri="{BB962C8B-B14F-4D97-AF65-F5344CB8AC3E}">
         <p14:creationId xmlns:p14="http://schemas.microsoft.com/office/powerpoint/2010/main" val="3468704632"/>
+      </p:ext>
+    </p:extLst>
+  </p:cSld>
+  <p:clrMapOvr>
+    <a:masterClrMapping/>
+  </p:clrMapOvr>
+</p:sld>
+</file>
+
+<file path=ppt/slides/slide8.xml><?xml version="1.0" encoding="utf-8"?>
+<p:sld xmlns:a="http://schemas.openxmlformats.org/drawingml/2006/main" xmlns:r="http://schemas.openxmlformats.org/officeDocument/2006/relationships" xmlns:p="http://schemas.openxmlformats.org/presentationml/2006/main">
+  <p:cSld>
+    <p:spTree>
+      <p:nvGrpSpPr>
+        <p:cNvPr id="1" name=""/>
+        <p:cNvGrpSpPr/>
+        <p:nvPr/>
+      </p:nvGrpSpPr>
+      <p:grpSpPr>
+        <a:xfrm>
+          <a:off x="0" y="0"/>
+          <a:ext cx="0" cy="0"/>
+          <a:chOff x="0" y="0"/>
+          <a:chExt cx="0" cy="0"/>
+        </a:xfrm>
+      </p:grpSpPr>
+    </p:spTree>
+    <p:extLst>
+      <p:ext uri="{BB962C8B-B14F-4D97-AF65-F5344CB8AC3E}">
+        <p14:creationId xmlns:p14="http://schemas.microsoft.com/office/powerpoint/2010/main" val="1367621272"/>
       </p:ext>
     </p:extLst>
   </p:cSld>

</xml_diff>

<commit_message>
Continued documentation, added pictures
</commit_message>
<xml_diff>
--- a/Dokumentation/Stand Oster/BayerPatternVearbeitung/Grafiken.pptx
+++ b/Dokumentation/Stand Oster/BayerPatternVearbeitung/Grafiken.pptx
@@ -265,7 +265,7 @@
           <a:p>
             <a:fld id="{395C48E5-9D41-460D-AEA6-338A2B2E3B37}" type="datetimeFigureOut">
               <a:rPr lang="de-DE" smtClean="0"/>
-              <a:t>20.07.2021</a:t>
+              <a:t>27.07.2021</a:t>
             </a:fld>
             <a:endParaRPr lang="de-DE"/>
           </a:p>
@@ -463,7 +463,7 @@
           <a:p>
             <a:fld id="{395C48E5-9D41-460D-AEA6-338A2B2E3B37}" type="datetimeFigureOut">
               <a:rPr lang="de-DE" smtClean="0"/>
-              <a:t>20.07.2021</a:t>
+              <a:t>27.07.2021</a:t>
             </a:fld>
             <a:endParaRPr lang="de-DE"/>
           </a:p>
@@ -671,7 +671,7 @@
           <a:p>
             <a:fld id="{395C48E5-9D41-460D-AEA6-338A2B2E3B37}" type="datetimeFigureOut">
               <a:rPr lang="de-DE" smtClean="0"/>
-              <a:t>20.07.2021</a:t>
+              <a:t>27.07.2021</a:t>
             </a:fld>
             <a:endParaRPr lang="de-DE"/>
           </a:p>
@@ -869,7 +869,7 @@
           <a:p>
             <a:fld id="{395C48E5-9D41-460D-AEA6-338A2B2E3B37}" type="datetimeFigureOut">
               <a:rPr lang="de-DE" smtClean="0"/>
-              <a:t>20.07.2021</a:t>
+              <a:t>27.07.2021</a:t>
             </a:fld>
             <a:endParaRPr lang="de-DE"/>
           </a:p>
@@ -1144,7 +1144,7 @@
           <a:p>
             <a:fld id="{395C48E5-9D41-460D-AEA6-338A2B2E3B37}" type="datetimeFigureOut">
               <a:rPr lang="de-DE" smtClean="0"/>
-              <a:t>20.07.2021</a:t>
+              <a:t>27.07.2021</a:t>
             </a:fld>
             <a:endParaRPr lang="de-DE"/>
           </a:p>
@@ -1409,7 +1409,7 @@
           <a:p>
             <a:fld id="{395C48E5-9D41-460D-AEA6-338A2B2E3B37}" type="datetimeFigureOut">
               <a:rPr lang="de-DE" smtClean="0"/>
-              <a:t>20.07.2021</a:t>
+              <a:t>27.07.2021</a:t>
             </a:fld>
             <a:endParaRPr lang="de-DE"/>
           </a:p>
@@ -1821,7 +1821,7 @@
           <a:p>
             <a:fld id="{395C48E5-9D41-460D-AEA6-338A2B2E3B37}" type="datetimeFigureOut">
               <a:rPr lang="de-DE" smtClean="0"/>
-              <a:t>20.07.2021</a:t>
+              <a:t>27.07.2021</a:t>
             </a:fld>
             <a:endParaRPr lang="de-DE"/>
           </a:p>
@@ -1962,7 +1962,7 @@
           <a:p>
             <a:fld id="{395C48E5-9D41-460D-AEA6-338A2B2E3B37}" type="datetimeFigureOut">
               <a:rPr lang="de-DE" smtClean="0"/>
-              <a:t>20.07.2021</a:t>
+              <a:t>27.07.2021</a:t>
             </a:fld>
             <a:endParaRPr lang="de-DE"/>
           </a:p>
@@ -2075,7 +2075,7 @@
           <a:p>
             <a:fld id="{395C48E5-9D41-460D-AEA6-338A2B2E3B37}" type="datetimeFigureOut">
               <a:rPr lang="de-DE" smtClean="0"/>
-              <a:t>20.07.2021</a:t>
+              <a:t>27.07.2021</a:t>
             </a:fld>
             <a:endParaRPr lang="de-DE"/>
           </a:p>
@@ -2386,7 +2386,7 @@
           <a:p>
             <a:fld id="{395C48E5-9D41-460D-AEA6-338A2B2E3B37}" type="datetimeFigureOut">
               <a:rPr lang="de-DE" smtClean="0"/>
-              <a:t>20.07.2021</a:t>
+              <a:t>27.07.2021</a:t>
             </a:fld>
             <a:endParaRPr lang="de-DE"/>
           </a:p>
@@ -2674,7 +2674,7 @@
           <a:p>
             <a:fld id="{395C48E5-9D41-460D-AEA6-338A2B2E3B37}" type="datetimeFigureOut">
               <a:rPr lang="de-DE" smtClean="0"/>
-              <a:t>20.07.2021</a:t>
+              <a:t>27.07.2021</a:t>
             </a:fld>
             <a:endParaRPr lang="de-DE"/>
           </a:p>
@@ -2915,7 +2915,7 @@
           <a:p>
             <a:fld id="{395C48E5-9D41-460D-AEA6-338A2B2E3B37}" type="datetimeFigureOut">
               <a:rPr lang="de-DE" smtClean="0"/>
-              <a:t>20.07.2021</a:t>
+              <a:t>27.07.2021</a:t>
             </a:fld>
             <a:endParaRPr lang="de-DE"/>
           </a:p>
@@ -9270,7 +9270,7 @@
           <p:nvPr>
             <p:extLst>
               <p:ext uri="{D42A27DB-BD31-4B8C-83A1-F6EECF244321}">
-                <p14:modId xmlns:p14="http://schemas.microsoft.com/office/powerpoint/2010/main" val="929213937"/>
+                <p14:modId xmlns:p14="http://schemas.microsoft.com/office/powerpoint/2010/main" val="1878399244"/>
               </p:ext>
             </p:extLst>
           </p:nvPr>
@@ -10770,7 +10770,7 @@
           <a:p>
             <a:r>
               <a:rPr lang="de-DE" sz="1600" dirty="0"/>
-              <a:t>Rl2</a:t>
+              <a:t>Rl3</a:t>
             </a:r>
           </a:p>
         </p:txBody>

</xml_diff>